<commit_message>
Updated Slides and added images and animations
</commit_message>
<xml_diff>
--- a/slides/Transfer_Learning_Presentation.pptx
+++ b/slides/Transfer_Learning_Presentation.pptx
@@ -6,14 +6,19 @@
   </p:sldMasterIdLst>
   <p:sldIdLst>
     <p:sldId id="256" r:id="rId2"/>
-    <p:sldId id="257" r:id="rId3"/>
-    <p:sldId id="264" r:id="rId4"/>
-    <p:sldId id="258" r:id="rId5"/>
-    <p:sldId id="259" r:id="rId6"/>
-    <p:sldId id="260" r:id="rId7"/>
-    <p:sldId id="261" r:id="rId8"/>
-    <p:sldId id="262" r:id="rId9"/>
-    <p:sldId id="263" r:id="rId10"/>
+    <p:sldId id="265" r:id="rId3"/>
+    <p:sldId id="257" r:id="rId4"/>
+    <p:sldId id="264" r:id="rId5"/>
+    <p:sldId id="258" r:id="rId6"/>
+    <p:sldId id="268" r:id="rId7"/>
+    <p:sldId id="259" r:id="rId8"/>
+    <p:sldId id="260" r:id="rId9"/>
+    <p:sldId id="261" r:id="rId10"/>
+    <p:sldId id="266" r:id="rId11"/>
+    <p:sldId id="262" r:id="rId12"/>
+    <p:sldId id="263" r:id="rId13"/>
+    <p:sldId id="269" r:id="rId14"/>
+    <p:sldId id="267" r:id="rId15"/>
   </p:sldIdLst>
   <p:sldSz cx="9144000" cy="6858000" type="screen4x3"/>
   <p:notesSz cx="6858000" cy="9144000"/>
@@ -134,7 +139,8 @@
 <file path=ppt/revisionInfo.xml><?xml version="1.0" encoding="utf-8"?>
 <p1510:revInfo xmlns:a="http://schemas.openxmlformats.org/drawingml/2006/main" xmlns:r="http://schemas.openxmlformats.org/officeDocument/2006/relationships" xmlns:p1510="http://schemas.microsoft.com/office/powerpoint/2015/10/main">
   <p1510:revLst>
-    <p1510:client id="{BF614848-F921-CF00-C663-608CC9EE8262}" v="5" dt="2024-12-23T18:35:52.175"/>
+    <p1510:client id="{A9F5F520-59B3-1B4F-4975-D5598A20FFFD}" v="246" dt="2024-12-25T21:48:18.192"/>
+    <p1510:client id="{C03BEFDD-5E21-5A87-1107-243E583CCB18}" v="53" dt="2024-12-25T21:55:30.002"/>
   </p1510:revLst>
 </p1510:revInfo>
 </file>
@@ -642,7 +648,7 @@
           <a:p>
             <a:fld id="{444FA04C-D7CF-4861-95F0-3F5ACF508755}" type="datetimeFigureOut">
               <a:rPr lang="en-US" smtClean="0"/>
-              <a:t>12/23/2024</a:t>
+              <a:t>12/25/2024</a:t>
             </a:fld>
             <a:endParaRPr lang="en-US" dirty="0"/>
           </a:p>
@@ -840,7 +846,7 @@
           <a:p>
             <a:fld id="{4B45B24B-F41A-4540-8EEC-C29B4F79802D}" type="datetimeFigureOut">
               <a:rPr lang="en-US" smtClean="0"/>
-              <a:t>12/23/2024</a:t>
+              <a:t>12/25/2024</a:t>
             </a:fld>
             <a:endParaRPr lang="en-US" dirty="0"/>
           </a:p>
@@ -1038,7 +1044,7 @@
           <a:p>
             <a:fld id="{CFBF989E-5397-49EE-B0F5-E72D9FFD7EC0}" type="datetimeFigureOut">
               <a:rPr lang="en-US" smtClean="0"/>
-              <a:t>12/23/2024</a:t>
+              <a:t>12/25/2024</a:t>
             </a:fld>
             <a:endParaRPr lang="en-US" dirty="0"/>
           </a:p>
@@ -1222,7 +1228,7 @@
           <a:p>
             <a:fld id="{0D6BC42F-EA91-460E-9436-9A6C9B1CB0C6}" type="datetimeFigureOut">
               <a:rPr lang="en-US" smtClean="0"/>
-              <a:t>12/23/2024</a:t>
+              <a:t>12/25/2024</a:t>
             </a:fld>
             <a:endParaRPr lang="en-US" dirty="0"/>
           </a:p>
@@ -1569,7 +1575,7 @@
           <a:p>
             <a:fld id="{823D4350-0632-4F67-B357-AFC21C62564D}" type="datetimeFigureOut">
               <a:rPr lang="en-US" smtClean="0"/>
-              <a:t>12/23/2024</a:t>
+              <a:t>12/25/2024</a:t>
             </a:fld>
             <a:endParaRPr lang="en-US" dirty="0"/>
           </a:p>
@@ -2055,7 +2061,7 @@
           <a:p>
             <a:fld id="{87F31A35-803D-44FA-BA88-E6B5FB347587}" type="datetimeFigureOut">
               <a:rPr lang="en-US" smtClean="0"/>
-              <a:t>12/23/2024</a:t>
+              <a:t>12/25/2024</a:t>
             </a:fld>
             <a:endParaRPr lang="en-US"/>
           </a:p>
@@ -2479,7 +2485,7 @@
           <a:p>
             <a:fld id="{14956CED-B3EE-49D9-9922-CBB48E543356}" type="datetimeFigureOut">
               <a:rPr lang="en-US" smtClean="0"/>
-              <a:t>12/23/2024</a:t>
+              <a:t>12/25/2024</a:t>
             </a:fld>
             <a:endParaRPr lang="en-US"/>
           </a:p>
@@ -2620,7 +2626,7 @@
           <a:p>
             <a:fld id="{3F9237B0-CC05-45CB-9D8E-44851499E325}" type="datetimeFigureOut">
               <a:rPr lang="en-US" smtClean="0"/>
-              <a:t>12/23/2024</a:t>
+              <a:t>12/25/2024</a:t>
             </a:fld>
             <a:endParaRPr lang="en-US" dirty="0"/>
           </a:p>
@@ -2761,7 +2767,7 @@
           <a:p>
             <a:fld id="{B7B41777-83B6-4CFA-89A1-52400FB2059F}" type="datetimeFigureOut">
               <a:rPr lang="en-US" smtClean="0"/>
-              <a:t>12/23/2024</a:t>
+              <a:t>12/25/2024</a:t>
             </a:fld>
             <a:endParaRPr lang="en-US"/>
           </a:p>
@@ -3297,7 +3303,7 @@
           <a:p>
             <a:fld id="{6F6AA2A1-C9A8-42DC-AF5F-29D58FE3A81E}" type="datetimeFigureOut">
               <a:rPr lang="en-US" smtClean="0"/>
-              <a:t>12/23/2024</a:t>
+              <a:t>12/25/2024</a:t>
             </a:fld>
             <a:endParaRPr lang="en-US" dirty="0"/>
           </a:p>
@@ -3820,7 +3826,7 @@
           <a:p>
             <a:fld id="{18FC28B6-2144-4760-B3DF-18C646FA52B1}" type="datetimeFigureOut">
               <a:rPr lang="en-US" smtClean="0"/>
-              <a:t>12/23/2024</a:t>
+              <a:t>12/25/2024</a:t>
             </a:fld>
             <a:endParaRPr lang="en-US" dirty="0"/>
           </a:p>
@@ -4196,7 +4202,7 @@
           <a:p>
             <a:fld id="{251F38EA-B09F-4C97-9264-D1353869D1EA}" type="datetimeFigureOut">
               <a:rPr lang="en-US" smtClean="0"/>
-              <a:t>12/23/2024</a:t>
+              <a:t>12/25/2024</a:t>
             </a:fld>
             <a:endParaRPr lang="en-US" dirty="0"/>
           </a:p>
@@ -4716,15 +4722,19 @@
           <a:p>
             <a:pPr algn="ctr"/>
             <a:r>
-              <a:rPr dirty="0"/>
+              <a:rPr sz="7200" dirty="0"/>
               <a:t>Transfer Learning in </a:t>
             </a:r>
             <a:br>
-              <a:rPr lang="en-GB"/>
+              <a:rPr lang="en-GB" sz="7200" dirty="0"/>
             </a:br>
             <a:r>
+              <a:rPr sz="7200" dirty="0"/>
               <a:t>Machine Learning</a:t>
             </a:r>
+            <a:endParaRPr sz="7200">
+              <a:latin typeface="Rockwell Condensed"/>
+            </a:endParaRPr>
           </a:p>
         </p:txBody>
       </p:sp>
@@ -4782,7 +4792,7 @@
 </p:sld>
 </file>
 
-<file path=ppt/slides/slide2.xml><?xml version="1.0" encoding="utf-8"?>
+<file path=ppt/slides/slide10.xml><?xml version="1.0" encoding="utf-8"?>
 <p:sld xmlns:a="http://schemas.openxmlformats.org/drawingml/2006/main" xmlns:r="http://schemas.openxmlformats.org/officeDocument/2006/relationships" xmlns:p="http://schemas.openxmlformats.org/presentationml/2006/main">
   <p:cSld>
     <p:spTree>
@@ -4815,7 +4825,7 @@
           <a:lstStyle/>
           <a:p>
             <a:r>
-              <a:t>What is Transfer Learning?</a:t>
+              <a:t>Challenges and Limitations</a:t>
             </a:r>
           </a:p>
         </p:txBody>
@@ -4838,14 +4848,28 @@
           <a:lstStyle/>
           <a:p>
             <a:r>
-              <a:rPr sz="3000" dirty="0"/>
-              <a:t>Transfer Learning is a machine learning technique where a model trained on one task is reused on a different but related task.</a:t>
-            </a:r>
-          </a:p>
-          <a:p>
-            <a:r>
-              <a:rPr sz="3000" dirty="0"/>
-              <a:t>Saves time, resources, and improves performance on tasks with limited data.</a:t>
+              <a:rPr sz="3200" dirty="0"/>
+              <a:t>Negative transfer: When the source and target tasks are too dissimilar.</a:t>
+            </a:r>
+          </a:p>
+          <a:p>
+            <a:r>
+              <a:rPr sz="3200" dirty="0"/>
+              <a:t>Computational cost of large </a:t>
+            </a:r>
+            <a:r>
+              <a:rPr lang="en-GB" sz="3200" dirty="0"/>
+              <a:t>pre-trained</a:t>
+            </a:r>
+            <a:r>
+              <a:rPr sz="3200" dirty="0"/>
+              <a:t> models.</a:t>
+            </a:r>
+          </a:p>
+          <a:p>
+            <a:r>
+              <a:rPr sz="3200" dirty="0"/>
+              <a:t>Fine-tuning can still require significant resources.</a:t>
             </a:r>
           </a:p>
         </p:txBody>
@@ -4855,7 +4879,7 @@
           <p:cNvPr id="4" name="Slide Number Placeholder 3">
             <a:extLst>
               <a:ext uri="{FF2B5EF4-FFF2-40B4-BE49-F238E27FC236}">
-                <a16:creationId xmlns:a16="http://schemas.microsoft.com/office/drawing/2014/main" id="{0F18CF34-0B36-7D96-10CA-CD58D87BB020}"/>
+                <a16:creationId xmlns:a16="http://schemas.microsoft.com/office/drawing/2014/main" id="{BE22E49D-0F32-DA93-2708-A8B33217FD90}"/>
               </a:ext>
             </a:extLst>
           </p:cNvPr>
@@ -4874,7 +4898,345 @@
             <a:fld id="{4FAB73BC-B049-4115-A692-8D63A059BFB8}" type="slidenum">
               <a:rPr lang="en-US" smtClean="0"/>
               <a:pPr/>
-              <a:t>2</a:t>
+              <a:t>10</a:t>
+            </a:fld>
+            <a:endParaRPr lang="en-US"/>
+          </a:p>
+        </p:txBody>
+      </p:sp>
+    </p:spTree>
+    <p:extLst>
+      <p:ext uri="{BB962C8B-B14F-4D97-AF65-F5344CB8AC3E}">
+        <p14:creationId xmlns:p14="http://schemas.microsoft.com/office/powerpoint/2010/main" val="2749226956"/>
+      </p:ext>
+    </p:extLst>
+  </p:cSld>
+  <p:clrMapOvr>
+    <a:masterClrMapping/>
+  </p:clrMapOvr>
+  <mc:AlternateContent xmlns:mc="http://schemas.openxmlformats.org/markup-compatibility/2006" xmlns:p159="http://schemas.microsoft.com/office/powerpoint/2015/09/main">
+    <mc:Choice Requires="p159">
+      <p:transition xmlns:p14="http://schemas.microsoft.com/office/powerpoint/2010/main" spd="slow" p14:dur="2000">
+        <p159:morph option="byWord"/>
+      </p:transition>
+    </mc:Choice>
+    <mc:Fallback xmlns="">
+      <p:transition spd="slow">
+        <p:fade/>
+      </p:transition>
+    </mc:Fallback>
+  </mc:AlternateContent>
+  <p:timing>
+    <p:tnLst>
+      <p:par>
+        <p:cTn id="1" dur="indefinite" restart="never" nodeType="tmRoot">
+          <p:childTnLst>
+            <p:seq concurrent="1" nextAc="seek">
+              <p:cTn id="2" dur="indefinite" nodeType="mainSeq">
+                <p:childTnLst>
+                  <p:par>
+                    <p:cTn id="3" fill="hold">
+                      <p:stCondLst>
+                        <p:cond delay="indefinite"/>
+                      </p:stCondLst>
+                      <p:childTnLst>
+                        <p:par>
+                          <p:cTn id="4" fill="hold">
+                            <p:stCondLst>
+                              <p:cond delay="0"/>
+                            </p:stCondLst>
+                            <p:childTnLst>
+                              <p:par>
+                                <p:cTn id="5" presetID="10" presetClass="entr" presetSubtype="0" fill="hold" grpId="0" nodeType="clickEffect">
+                                  <p:stCondLst>
+                                    <p:cond delay="0"/>
+                                  </p:stCondLst>
+                                  <p:childTnLst>
+                                    <p:set>
+                                      <p:cBhvr>
+                                        <p:cTn id="6" dur="1" fill="hold">
+                                          <p:stCondLst>
+                                            <p:cond delay="0"/>
+                                          </p:stCondLst>
+                                        </p:cTn>
+                                        <p:tgtEl>
+                                          <p:spTgt spid="3">
+                                            <p:txEl>
+                                              <p:pRg st="0" end="0"/>
+                                            </p:txEl>
+                                          </p:spTgt>
+                                        </p:tgtEl>
+                                        <p:attrNameLst>
+                                          <p:attrName>style.visibility</p:attrName>
+                                        </p:attrNameLst>
+                                      </p:cBhvr>
+                                      <p:to>
+                                        <p:strVal val="visible"/>
+                                      </p:to>
+                                    </p:set>
+                                    <p:animEffect transition="in" filter="fade">
+                                      <p:cBhvr>
+                                        <p:cTn id="7" dur="500"/>
+                                        <p:tgtEl>
+                                          <p:spTgt spid="3">
+                                            <p:txEl>
+                                              <p:pRg st="0" end="0"/>
+                                            </p:txEl>
+                                          </p:spTgt>
+                                        </p:tgtEl>
+                                      </p:cBhvr>
+                                    </p:animEffect>
+                                  </p:childTnLst>
+                                </p:cTn>
+                              </p:par>
+                            </p:childTnLst>
+                          </p:cTn>
+                        </p:par>
+                      </p:childTnLst>
+                    </p:cTn>
+                  </p:par>
+                  <p:par>
+                    <p:cTn id="8" fill="hold">
+                      <p:stCondLst>
+                        <p:cond delay="indefinite"/>
+                      </p:stCondLst>
+                      <p:childTnLst>
+                        <p:par>
+                          <p:cTn id="9" fill="hold">
+                            <p:stCondLst>
+                              <p:cond delay="0"/>
+                            </p:stCondLst>
+                            <p:childTnLst>
+                              <p:par>
+                                <p:cTn id="10" presetID="10" presetClass="entr" presetSubtype="0" fill="hold" grpId="0" nodeType="clickEffect">
+                                  <p:stCondLst>
+                                    <p:cond delay="0"/>
+                                  </p:stCondLst>
+                                  <p:childTnLst>
+                                    <p:set>
+                                      <p:cBhvr>
+                                        <p:cTn id="11" dur="1" fill="hold">
+                                          <p:stCondLst>
+                                            <p:cond delay="0"/>
+                                          </p:stCondLst>
+                                        </p:cTn>
+                                        <p:tgtEl>
+                                          <p:spTgt spid="3">
+                                            <p:txEl>
+                                              <p:pRg st="1" end="1"/>
+                                            </p:txEl>
+                                          </p:spTgt>
+                                        </p:tgtEl>
+                                        <p:attrNameLst>
+                                          <p:attrName>style.visibility</p:attrName>
+                                        </p:attrNameLst>
+                                      </p:cBhvr>
+                                      <p:to>
+                                        <p:strVal val="visible"/>
+                                      </p:to>
+                                    </p:set>
+                                    <p:animEffect transition="in" filter="fade">
+                                      <p:cBhvr>
+                                        <p:cTn id="12" dur="500"/>
+                                        <p:tgtEl>
+                                          <p:spTgt spid="3">
+                                            <p:txEl>
+                                              <p:pRg st="1" end="1"/>
+                                            </p:txEl>
+                                          </p:spTgt>
+                                        </p:tgtEl>
+                                      </p:cBhvr>
+                                    </p:animEffect>
+                                  </p:childTnLst>
+                                </p:cTn>
+                              </p:par>
+                            </p:childTnLst>
+                          </p:cTn>
+                        </p:par>
+                      </p:childTnLst>
+                    </p:cTn>
+                  </p:par>
+                  <p:par>
+                    <p:cTn id="13" fill="hold">
+                      <p:stCondLst>
+                        <p:cond delay="indefinite"/>
+                      </p:stCondLst>
+                      <p:childTnLst>
+                        <p:par>
+                          <p:cTn id="14" fill="hold">
+                            <p:stCondLst>
+                              <p:cond delay="0"/>
+                            </p:stCondLst>
+                            <p:childTnLst>
+                              <p:par>
+                                <p:cTn id="15" presetID="10" presetClass="entr" presetSubtype="0" fill="hold" grpId="0" nodeType="clickEffect">
+                                  <p:stCondLst>
+                                    <p:cond delay="0"/>
+                                  </p:stCondLst>
+                                  <p:childTnLst>
+                                    <p:set>
+                                      <p:cBhvr>
+                                        <p:cTn id="16" dur="1" fill="hold">
+                                          <p:stCondLst>
+                                            <p:cond delay="0"/>
+                                          </p:stCondLst>
+                                        </p:cTn>
+                                        <p:tgtEl>
+                                          <p:spTgt spid="3">
+                                            <p:txEl>
+                                              <p:pRg st="2" end="2"/>
+                                            </p:txEl>
+                                          </p:spTgt>
+                                        </p:tgtEl>
+                                        <p:attrNameLst>
+                                          <p:attrName>style.visibility</p:attrName>
+                                        </p:attrNameLst>
+                                      </p:cBhvr>
+                                      <p:to>
+                                        <p:strVal val="visible"/>
+                                      </p:to>
+                                    </p:set>
+                                    <p:animEffect transition="in" filter="fade">
+                                      <p:cBhvr>
+                                        <p:cTn id="17" dur="500"/>
+                                        <p:tgtEl>
+                                          <p:spTgt spid="3">
+                                            <p:txEl>
+                                              <p:pRg st="2" end="2"/>
+                                            </p:txEl>
+                                          </p:spTgt>
+                                        </p:tgtEl>
+                                      </p:cBhvr>
+                                    </p:animEffect>
+                                  </p:childTnLst>
+                                </p:cTn>
+                              </p:par>
+                            </p:childTnLst>
+                          </p:cTn>
+                        </p:par>
+                      </p:childTnLst>
+                    </p:cTn>
+                  </p:par>
+                </p:childTnLst>
+              </p:cTn>
+              <p:prevCondLst>
+                <p:cond evt="onPrev" delay="0">
+                  <p:tgtEl>
+                    <p:sldTgt/>
+                  </p:tgtEl>
+                </p:cond>
+              </p:prevCondLst>
+              <p:nextCondLst>
+                <p:cond evt="onNext" delay="0">
+                  <p:tgtEl>
+                    <p:sldTgt/>
+                  </p:tgtEl>
+                </p:cond>
+              </p:nextCondLst>
+            </p:seq>
+          </p:childTnLst>
+        </p:cTn>
+      </p:par>
+    </p:tnLst>
+    <p:bldLst>
+      <p:bldP spid="3" grpId="0" build="p"/>
+    </p:bldLst>
+  </p:timing>
+</p:sld>
+</file>
+
+<file path=ppt/slides/slide11.xml><?xml version="1.0" encoding="utf-8"?>
+<p:sld xmlns:a="http://schemas.openxmlformats.org/drawingml/2006/main" xmlns:r="http://schemas.openxmlformats.org/officeDocument/2006/relationships" xmlns:p="http://schemas.openxmlformats.org/presentationml/2006/main">
+  <p:cSld>
+    <p:spTree>
+      <p:nvGrpSpPr>
+        <p:cNvPr id="1" name=""/>
+        <p:cNvGrpSpPr/>
+        <p:nvPr/>
+      </p:nvGrpSpPr>
+      <p:grpSpPr>
+        <a:xfrm>
+          <a:off x="0" y="0"/>
+          <a:ext cx="0" cy="0"/>
+          <a:chOff x="0" y="0"/>
+          <a:chExt cx="0" cy="0"/>
+        </a:xfrm>
+      </p:grpSpPr>
+      <p:sp>
+        <p:nvSpPr>
+          <p:cNvPr id="2" name="Title 1"/>
+          <p:cNvSpPr>
+            <a:spLocks noGrp="1"/>
+          </p:cNvSpPr>
+          <p:nvPr>
+            <p:ph type="title"/>
+          </p:nvPr>
+        </p:nvSpPr>
+        <p:spPr/>
+        <p:txBody>
+          <a:bodyPr/>
+          <a:lstStyle/>
+          <a:p>
+            <a:r>
+              <a:rPr lang="en-GB" dirty="0"/>
+              <a:t>Code example</a:t>
+            </a:r>
+            <a:endParaRPr dirty="0"/>
+          </a:p>
+        </p:txBody>
+      </p:sp>
+      <p:sp>
+        <p:nvSpPr>
+          <p:cNvPr id="3" name="Content Placeholder 2"/>
+          <p:cNvSpPr>
+            <a:spLocks noGrp="1"/>
+          </p:cNvSpPr>
+          <p:nvPr>
+            <p:ph idx="1"/>
+          </p:nvPr>
+        </p:nvSpPr>
+        <p:spPr/>
+        <p:txBody>
+          <a:bodyPr>
+            <a:normAutofit/>
+          </a:bodyPr>
+          <a:lstStyle/>
+          <a:p>
+            <a:r>
+              <a:rPr lang="en-GB" sz="3200" dirty="0">
+                <a:hlinkClick r:id="rId2"/>
+              </a:rPr>
+              <a:t>Code Example</a:t>
+            </a:r>
+            <a:endParaRPr sz="3200" dirty="0"/>
+          </a:p>
+        </p:txBody>
+      </p:sp>
+      <p:sp>
+        <p:nvSpPr>
+          <p:cNvPr id="4" name="Slide Number Placeholder 3">
+            <a:extLst>
+              <a:ext uri="{FF2B5EF4-FFF2-40B4-BE49-F238E27FC236}">
+                <a16:creationId xmlns:a16="http://schemas.microsoft.com/office/drawing/2014/main" id="{EE44322F-30C9-AB52-54E8-1E0E2FC8A54F}"/>
+              </a:ext>
+            </a:extLst>
+          </p:cNvPr>
+          <p:cNvSpPr>
+            <a:spLocks noGrp="1"/>
+          </p:cNvSpPr>
+          <p:nvPr>
+            <p:ph type="sldNum" sz="quarter" idx="12"/>
+          </p:nvPr>
+        </p:nvSpPr>
+        <p:spPr/>
+        <p:txBody>
+          <a:bodyPr/>
+          <a:lstStyle/>
+          <a:p>
+            <a:fld id="{4FAB73BC-B049-4115-A692-8D63A059BFB8}" type="slidenum">
+              <a:rPr lang="en-US" smtClean="0"/>
+              <a:pPr/>
+              <a:t>11</a:t>
             </a:fld>
             <a:endParaRPr lang="en-US"/>
           </a:p>
@@ -4900,7 +5262,1317 @@
 </p:sld>
 </file>
 
+<file path=ppt/slides/slide12.xml><?xml version="1.0" encoding="utf-8"?>
+<p:sld xmlns:a="http://schemas.openxmlformats.org/drawingml/2006/main" xmlns:r="http://schemas.openxmlformats.org/officeDocument/2006/relationships" xmlns:p="http://schemas.openxmlformats.org/presentationml/2006/main">
+  <p:cSld>
+    <p:spTree>
+      <p:nvGrpSpPr>
+        <p:cNvPr id="1" name=""/>
+        <p:cNvGrpSpPr/>
+        <p:nvPr/>
+      </p:nvGrpSpPr>
+      <p:grpSpPr>
+        <a:xfrm>
+          <a:off x="0" y="0"/>
+          <a:ext cx="0" cy="0"/>
+          <a:chOff x="0" y="0"/>
+          <a:chExt cx="0" cy="0"/>
+        </a:xfrm>
+      </p:grpSpPr>
+      <p:sp>
+        <p:nvSpPr>
+          <p:cNvPr id="2" name="Title 1"/>
+          <p:cNvSpPr>
+            <a:spLocks noGrp="1"/>
+          </p:cNvSpPr>
+          <p:nvPr>
+            <p:ph type="title"/>
+          </p:nvPr>
+        </p:nvSpPr>
+        <p:spPr/>
+        <p:txBody>
+          <a:bodyPr/>
+          <a:lstStyle/>
+          <a:p>
+            <a:r>
+              <a:rPr dirty="0"/>
+              <a:t>Summary</a:t>
+            </a:r>
+          </a:p>
+        </p:txBody>
+      </p:sp>
+      <p:sp>
+        <p:nvSpPr>
+          <p:cNvPr id="3" name="Content Placeholder 2"/>
+          <p:cNvSpPr>
+            <a:spLocks noGrp="1"/>
+          </p:cNvSpPr>
+          <p:nvPr>
+            <p:ph idx="1"/>
+          </p:nvPr>
+        </p:nvSpPr>
+        <p:spPr/>
+        <p:txBody>
+          <a:bodyPr vert="horz" lIns="91440" tIns="45720" rIns="91440" bIns="45720" rtlCol="0" anchor="t">
+            <a:normAutofit/>
+          </a:bodyPr>
+          <a:lstStyle/>
+          <a:p>
+            <a:r>
+              <a:rPr sz="3200" dirty="0"/>
+              <a:t>Transfer learning enables efficient and effective machine learning by </a:t>
+            </a:r>
+            <a:r>
+              <a:rPr sz="3200"/>
+              <a:t>leveraging existing knowledge.</a:t>
+            </a:r>
+            <a:br>
+              <a:rPr lang="en-US" sz="3200" dirty="0"/>
+            </a:br>
+            <a:endParaRPr lang="en-US" sz="3200" dirty="0"/>
+          </a:p>
+          <a:p>
+            <a:pPr>
+              <a:buClr>
+                <a:srgbClr val="9E3611"/>
+              </a:buClr>
+            </a:pPr>
+            <a:r>
+              <a:rPr lang="en-US" sz="3200" dirty="0"/>
+              <a:t>Make sure to use the right base model </a:t>
+            </a:r>
+            <a:r>
+              <a:rPr lang="en-US" sz="3200"/>
+              <a:t>for the new task to save time and resources</a:t>
+            </a:r>
+            <a:endParaRPr lang="en-US" sz="3200" dirty="0"/>
+          </a:p>
+        </p:txBody>
+      </p:sp>
+      <p:sp>
+        <p:nvSpPr>
+          <p:cNvPr id="4" name="Slide Number Placeholder 3">
+            <a:extLst>
+              <a:ext uri="{FF2B5EF4-FFF2-40B4-BE49-F238E27FC236}">
+                <a16:creationId xmlns:a16="http://schemas.microsoft.com/office/drawing/2014/main" id="{0F48783E-E8FD-F30F-F322-0204CD1E4619}"/>
+              </a:ext>
+            </a:extLst>
+          </p:cNvPr>
+          <p:cNvSpPr>
+            <a:spLocks noGrp="1"/>
+          </p:cNvSpPr>
+          <p:nvPr>
+            <p:ph type="sldNum" sz="quarter" idx="12"/>
+          </p:nvPr>
+        </p:nvSpPr>
+        <p:spPr/>
+        <p:txBody>
+          <a:bodyPr/>
+          <a:lstStyle/>
+          <a:p>
+            <a:fld id="{4FAB73BC-B049-4115-A692-8D63A059BFB8}" type="slidenum">
+              <a:rPr lang="en-US" smtClean="0"/>
+              <a:pPr/>
+              <a:t>12</a:t>
+            </a:fld>
+            <a:endParaRPr lang="en-US"/>
+          </a:p>
+        </p:txBody>
+      </p:sp>
+    </p:spTree>
+  </p:cSld>
+  <p:clrMapOvr>
+    <a:masterClrMapping/>
+  </p:clrMapOvr>
+  <mc:AlternateContent xmlns:mc="http://schemas.openxmlformats.org/markup-compatibility/2006" xmlns:p159="http://schemas.microsoft.com/office/powerpoint/2015/09/main">
+    <mc:Choice Requires="p159">
+      <p:transition xmlns:p14="http://schemas.microsoft.com/office/powerpoint/2010/main" spd="slow" p14:dur="2000">
+        <p159:morph option="byWord"/>
+      </p:transition>
+    </mc:Choice>
+    <mc:Fallback xmlns="">
+      <p:transition spd="slow">
+        <p:fade/>
+      </p:transition>
+    </mc:Fallback>
+  </mc:AlternateContent>
+  <p:timing>
+    <p:tnLst>
+      <p:par>
+        <p:cTn id="1" dur="indefinite" restart="never" nodeType="tmRoot">
+          <p:childTnLst>
+            <p:seq concurrent="1" nextAc="seek">
+              <p:cTn id="2" dur="indefinite" nodeType="mainSeq">
+                <p:childTnLst>
+                  <p:par>
+                    <p:cTn id="3" fill="hold">
+                      <p:stCondLst>
+                        <p:cond delay="indefinite"/>
+                      </p:stCondLst>
+                      <p:childTnLst>
+                        <p:par>
+                          <p:cTn id="4" fill="hold">
+                            <p:stCondLst>
+                              <p:cond delay="0"/>
+                            </p:stCondLst>
+                            <p:childTnLst>
+                              <p:par>
+                                <p:cTn id="5" presetID="10" presetClass="entr" presetSubtype="0" fill="hold" grpId="0" nodeType="clickEffect">
+                                  <p:stCondLst>
+                                    <p:cond delay="0"/>
+                                  </p:stCondLst>
+                                  <p:childTnLst>
+                                    <p:set>
+                                      <p:cBhvr>
+                                        <p:cTn id="6" dur="1" fill="hold">
+                                          <p:stCondLst>
+                                            <p:cond delay="0"/>
+                                          </p:stCondLst>
+                                        </p:cTn>
+                                        <p:tgtEl>
+                                          <p:spTgt spid="3">
+                                            <p:txEl>
+                                              <p:pRg st="0" end="0"/>
+                                            </p:txEl>
+                                          </p:spTgt>
+                                        </p:tgtEl>
+                                        <p:attrNameLst>
+                                          <p:attrName>style.visibility</p:attrName>
+                                        </p:attrNameLst>
+                                      </p:cBhvr>
+                                      <p:to>
+                                        <p:strVal val="visible"/>
+                                      </p:to>
+                                    </p:set>
+                                    <p:animEffect transition="in" filter="fade">
+                                      <p:cBhvr>
+                                        <p:cTn id="7" dur="500"/>
+                                        <p:tgtEl>
+                                          <p:spTgt spid="3">
+                                            <p:txEl>
+                                              <p:pRg st="0" end="0"/>
+                                            </p:txEl>
+                                          </p:spTgt>
+                                        </p:tgtEl>
+                                      </p:cBhvr>
+                                    </p:animEffect>
+                                  </p:childTnLst>
+                                </p:cTn>
+                              </p:par>
+                            </p:childTnLst>
+                          </p:cTn>
+                        </p:par>
+                      </p:childTnLst>
+                    </p:cTn>
+                  </p:par>
+                  <p:par>
+                    <p:cTn id="8" fill="hold">
+                      <p:stCondLst>
+                        <p:cond delay="indefinite"/>
+                      </p:stCondLst>
+                      <p:childTnLst>
+                        <p:par>
+                          <p:cTn id="9" fill="hold">
+                            <p:stCondLst>
+                              <p:cond delay="0"/>
+                            </p:stCondLst>
+                            <p:childTnLst>
+                              <p:par>
+                                <p:cTn id="10" presetID="10" presetClass="entr" presetSubtype="0" fill="hold" grpId="0" nodeType="clickEffect">
+                                  <p:stCondLst>
+                                    <p:cond delay="0"/>
+                                  </p:stCondLst>
+                                  <p:childTnLst>
+                                    <p:set>
+                                      <p:cBhvr>
+                                        <p:cTn id="11" dur="1" fill="hold">
+                                          <p:stCondLst>
+                                            <p:cond delay="0"/>
+                                          </p:stCondLst>
+                                        </p:cTn>
+                                        <p:tgtEl>
+                                          <p:spTgt spid="3">
+                                            <p:txEl>
+                                              <p:pRg st="1" end="1"/>
+                                            </p:txEl>
+                                          </p:spTgt>
+                                        </p:tgtEl>
+                                        <p:attrNameLst>
+                                          <p:attrName>style.visibility</p:attrName>
+                                        </p:attrNameLst>
+                                      </p:cBhvr>
+                                      <p:to>
+                                        <p:strVal val="visible"/>
+                                      </p:to>
+                                    </p:set>
+                                    <p:animEffect transition="in" filter="fade">
+                                      <p:cBhvr>
+                                        <p:cTn id="12" dur="500"/>
+                                        <p:tgtEl>
+                                          <p:spTgt spid="3">
+                                            <p:txEl>
+                                              <p:pRg st="1" end="1"/>
+                                            </p:txEl>
+                                          </p:spTgt>
+                                        </p:tgtEl>
+                                      </p:cBhvr>
+                                    </p:animEffect>
+                                  </p:childTnLst>
+                                </p:cTn>
+                              </p:par>
+                            </p:childTnLst>
+                          </p:cTn>
+                        </p:par>
+                      </p:childTnLst>
+                    </p:cTn>
+                  </p:par>
+                </p:childTnLst>
+              </p:cTn>
+              <p:prevCondLst>
+                <p:cond evt="onPrev" delay="0">
+                  <p:tgtEl>
+                    <p:sldTgt/>
+                  </p:tgtEl>
+                </p:cond>
+              </p:prevCondLst>
+              <p:nextCondLst>
+                <p:cond evt="onNext" delay="0">
+                  <p:tgtEl>
+                    <p:sldTgt/>
+                  </p:tgtEl>
+                </p:cond>
+              </p:nextCondLst>
+            </p:seq>
+          </p:childTnLst>
+        </p:cTn>
+      </p:par>
+    </p:tnLst>
+    <p:bldLst>
+      <p:bldP spid="3" grpId="0" build="p"/>
+    </p:bldLst>
+  </p:timing>
+</p:sld>
+</file>
+
+<file path=ppt/slides/slide13.xml><?xml version="1.0" encoding="utf-8"?>
+<p:sld xmlns:a="http://schemas.openxmlformats.org/drawingml/2006/main" xmlns:r="http://schemas.openxmlformats.org/officeDocument/2006/relationships" xmlns:p="http://schemas.openxmlformats.org/presentationml/2006/main">
+  <p:cSld>
+    <p:spTree>
+      <p:nvGrpSpPr>
+        <p:cNvPr id="1" name=""/>
+        <p:cNvGrpSpPr/>
+        <p:nvPr/>
+      </p:nvGrpSpPr>
+      <p:grpSpPr>
+        <a:xfrm>
+          <a:off x="0" y="0"/>
+          <a:ext cx="0" cy="0"/>
+          <a:chOff x="0" y="0"/>
+          <a:chExt cx="0" cy="0"/>
+        </a:xfrm>
+      </p:grpSpPr>
+      <p:sp>
+        <p:nvSpPr>
+          <p:cNvPr id="4" name="Slide Number Placeholder 3">
+            <a:extLst>
+              <a:ext uri="{FF2B5EF4-FFF2-40B4-BE49-F238E27FC236}">
+                <a16:creationId xmlns:a16="http://schemas.microsoft.com/office/drawing/2014/main" id="{BE22E49D-0F32-DA93-2708-A8B33217FD90}"/>
+              </a:ext>
+            </a:extLst>
+          </p:cNvPr>
+          <p:cNvSpPr>
+            <a:spLocks noGrp="1"/>
+          </p:cNvSpPr>
+          <p:nvPr>
+            <p:ph type="sldNum" sz="quarter" idx="12"/>
+          </p:nvPr>
+        </p:nvSpPr>
+        <p:spPr/>
+        <p:txBody>
+          <a:bodyPr/>
+          <a:lstStyle/>
+          <a:p>
+            <a:fld id="{4FAB73BC-B049-4115-A692-8D63A059BFB8}" type="slidenum">
+              <a:rPr lang="en-US" smtClean="0"/>
+              <a:pPr/>
+              <a:t>13</a:t>
+            </a:fld>
+            <a:endParaRPr lang="en-US"/>
+          </a:p>
+        </p:txBody>
+      </p:sp>
+      <p:grpSp>
+        <p:nvGrpSpPr>
+          <p:cNvPr id="8" name="Group 7">
+            <a:extLst>
+              <a:ext uri="{FF2B5EF4-FFF2-40B4-BE49-F238E27FC236}">
+                <a16:creationId xmlns:a16="http://schemas.microsoft.com/office/drawing/2014/main" id="{D9333EA0-9540-EB06-648B-12C2542E779B}"/>
+              </a:ext>
+            </a:extLst>
+          </p:cNvPr>
+          <p:cNvGrpSpPr/>
+          <p:nvPr/>
+        </p:nvGrpSpPr>
+        <p:grpSpPr>
+          <a:xfrm>
+            <a:off x="397670" y="627119"/>
+            <a:ext cx="8346482" cy="5077107"/>
+            <a:chOff x="369360" y="832364"/>
+            <a:chExt cx="8346482" cy="5077107"/>
+          </a:xfrm>
+        </p:grpSpPr>
+        <p:pic>
+          <p:nvPicPr>
+            <p:cNvPr id="2" name="Picture 1" descr="A person in a suit pointing an object&#10;&#10;Description automatically generated">
+              <a:extLst>
+                <a:ext uri="{FF2B5EF4-FFF2-40B4-BE49-F238E27FC236}">
+                  <a16:creationId xmlns:a16="http://schemas.microsoft.com/office/drawing/2014/main" id="{DC352754-6655-2452-207A-6E13A1802D57}"/>
+                </a:ext>
+              </a:extLst>
+            </p:cNvPr>
+            <p:cNvPicPr>
+              <a:picLocks noChangeAspect="1"/>
+            </p:cNvPicPr>
+            <p:nvPr/>
+          </p:nvPicPr>
+          <p:blipFill>
+            <a:blip r:embed="rId2"/>
+            <a:stretch>
+              <a:fillRect/>
+            </a:stretch>
+          </p:blipFill>
+          <p:spPr>
+            <a:xfrm>
+              <a:off x="369360" y="832364"/>
+              <a:ext cx="8346482" cy="4675320"/>
+            </a:xfrm>
+            <a:prstGeom prst="rect">
+              <a:avLst/>
+            </a:prstGeom>
+          </p:spPr>
+        </p:pic>
+        <p:sp>
+          <p:nvSpPr>
+            <p:cNvPr id="3" name="TextBox 2">
+              <a:extLst>
+                <a:ext uri="{FF2B5EF4-FFF2-40B4-BE49-F238E27FC236}">
+                  <a16:creationId xmlns:a16="http://schemas.microsoft.com/office/drawing/2014/main" id="{E837C80D-9854-FDA9-D63D-DA1FDC844EAE}"/>
+                </a:ext>
+              </a:extLst>
+            </p:cNvPr>
+            <p:cNvSpPr txBox="1"/>
+            <p:nvPr/>
+          </p:nvSpPr>
+          <p:spPr>
+            <a:xfrm>
+              <a:off x="464948" y="5694027"/>
+              <a:ext cx="7835719" cy="215444"/>
+            </a:xfrm>
+            <a:prstGeom prst="rect">
+              <a:avLst/>
+            </a:prstGeom>
+            <a:noFill/>
+          </p:spPr>
+          <p:txBody>
+            <a:bodyPr rot="0" spcFirstLastPara="0" vertOverflow="overflow" horzOverflow="overflow" vert="horz" wrap="square" lIns="91440" tIns="45720" rIns="91440" bIns="45720" numCol="1" spcCol="0" rtlCol="0" fromWordArt="0" anchor="t" anchorCtr="0" forceAA="0" compatLnSpc="1">
+              <a:prstTxWarp prst="textNoShape">
+                <a:avLst/>
+              </a:prstTxWarp>
+              <a:spAutoFit/>
+            </a:bodyPr>
+            <a:lstStyle/>
+            <a:p>
+              <a:r>
+                <a:rPr lang="en-US" sz="800"/>
+                <a:t>Image source: </a:t>
+              </a:r>
+              <a:r>
+                <a:rPr lang="en-US" sz="800" dirty="0">
+                  <a:solidFill>
+                    <a:srgbClr val="FFC000"/>
+                  </a:solidFill>
+                  <a:ea typeface="+mn-lt"/>
+                  <a:cs typeface="+mn-lt"/>
+                  <a:hlinkClick r:id="rId3"/>
+                </a:rPr>
+                <a:t>https://medium.com/@meghanabhange13/the-hitchhikers-intro-guide-to-transfer-learning-9a96090e12f2</a:t>
+              </a:r>
+              <a:endParaRPr lang="en-US" sz="1050">
+                <a:solidFill>
+                  <a:srgbClr val="FFC000"/>
+                </a:solidFill>
+              </a:endParaRPr>
+            </a:p>
+          </p:txBody>
+        </p:sp>
+      </p:grpSp>
+    </p:spTree>
+    <p:extLst>
+      <p:ext uri="{BB962C8B-B14F-4D97-AF65-F5344CB8AC3E}">
+        <p14:creationId xmlns:p14="http://schemas.microsoft.com/office/powerpoint/2010/main" val="1589159526"/>
+      </p:ext>
+    </p:extLst>
+  </p:cSld>
+  <p:clrMapOvr>
+    <a:masterClrMapping/>
+  </p:clrMapOvr>
+  <mc:AlternateContent xmlns:mc="http://schemas.openxmlformats.org/markup-compatibility/2006">
+    <mc:Choice xmlns:p159="http://schemas.microsoft.com/office/powerpoint/2015/09/main" Requires="p159">
+      <p:transition xmlns:p14="http://schemas.microsoft.com/office/powerpoint/2010/main" spd="slow" p14:dur="2000">
+        <p159:morph option="byWord"/>
+      </p:transition>
+    </mc:Choice>
+    <mc:Fallback>
+      <p:transition spd="slow">
+        <p:fade/>
+      </p:transition>
+    </mc:Fallback>
+  </mc:AlternateContent>
+</p:sld>
+</file>
+
+<file path=ppt/slides/slide14.xml><?xml version="1.0" encoding="utf-8"?>
+<p:sld xmlns:a="http://schemas.openxmlformats.org/drawingml/2006/main" xmlns:r="http://schemas.openxmlformats.org/officeDocument/2006/relationships" xmlns:p="http://schemas.openxmlformats.org/presentationml/2006/main">
+  <p:cSld>
+    <p:spTree>
+      <p:nvGrpSpPr>
+        <p:cNvPr id="1" name=""/>
+        <p:cNvGrpSpPr/>
+        <p:nvPr/>
+      </p:nvGrpSpPr>
+      <p:grpSpPr>
+        <a:xfrm>
+          <a:off x="0" y="0"/>
+          <a:ext cx="0" cy="0"/>
+          <a:chOff x="0" y="0"/>
+          <a:chExt cx="0" cy="0"/>
+        </a:xfrm>
+      </p:grpSpPr>
+      <p:sp>
+        <p:nvSpPr>
+          <p:cNvPr id="2" name="Title 1"/>
+          <p:cNvSpPr>
+            <a:spLocks noGrp="1"/>
+          </p:cNvSpPr>
+          <p:nvPr>
+            <p:ph type="title"/>
+          </p:nvPr>
+        </p:nvSpPr>
+        <p:spPr/>
+        <p:txBody>
+          <a:bodyPr/>
+          <a:lstStyle/>
+          <a:p>
+            <a:r>
+              <a:rPr lang="en-US" dirty="0"/>
+              <a:t>QUESTIONs?</a:t>
+            </a:r>
+            <a:endParaRPr dirty="0"/>
+          </a:p>
+        </p:txBody>
+      </p:sp>
+      <p:sp>
+        <p:nvSpPr>
+          <p:cNvPr id="3" name="Content Placeholder 2"/>
+          <p:cNvSpPr>
+            <a:spLocks noGrp="1"/>
+          </p:cNvSpPr>
+          <p:nvPr>
+            <p:ph idx="1"/>
+          </p:nvPr>
+        </p:nvSpPr>
+        <p:spPr/>
+        <p:txBody>
+          <a:bodyPr vert="horz" lIns="91440" tIns="45720" rIns="91440" bIns="45720" rtlCol="0" anchor="t">
+            <a:normAutofit/>
+          </a:bodyPr>
+          <a:lstStyle/>
+          <a:p>
+            <a:pPr marL="0" indent="0">
+              <a:buNone/>
+            </a:pPr>
+            <a:endParaRPr lang="en-US" sz="3200" dirty="0"/>
+          </a:p>
+          <a:p>
+            <a:pPr>
+              <a:buClr>
+                <a:srgbClr val="9E3611"/>
+              </a:buClr>
+            </a:pPr>
+            <a:r>
+              <a:rPr sz="3200" dirty="0"/>
+              <a:t>Thank you for your attention! </a:t>
+            </a:r>
+            <a:endParaRPr lang="en-US" sz="3200" dirty="0"/>
+          </a:p>
+          <a:p>
+            <a:pPr>
+              <a:buClr>
+                <a:srgbClr val="9E3611"/>
+              </a:buClr>
+            </a:pPr>
+            <a:r>
+              <a:rPr sz="3200" dirty="0"/>
+              <a:t>Any questions?</a:t>
+            </a:r>
+            <a:endParaRPr/>
+          </a:p>
+        </p:txBody>
+      </p:sp>
+      <p:sp>
+        <p:nvSpPr>
+          <p:cNvPr id="4" name="Slide Number Placeholder 3">
+            <a:extLst>
+              <a:ext uri="{FF2B5EF4-FFF2-40B4-BE49-F238E27FC236}">
+                <a16:creationId xmlns:a16="http://schemas.microsoft.com/office/drawing/2014/main" id="{0F48783E-E8FD-F30F-F322-0204CD1E4619}"/>
+              </a:ext>
+            </a:extLst>
+          </p:cNvPr>
+          <p:cNvSpPr>
+            <a:spLocks noGrp="1"/>
+          </p:cNvSpPr>
+          <p:nvPr>
+            <p:ph type="sldNum" sz="quarter" idx="12"/>
+          </p:nvPr>
+        </p:nvSpPr>
+        <p:spPr/>
+        <p:txBody>
+          <a:bodyPr/>
+          <a:lstStyle/>
+          <a:p>
+            <a:fld id="{4FAB73BC-B049-4115-A692-8D63A059BFB8}" type="slidenum">
+              <a:rPr lang="en-US" smtClean="0"/>
+              <a:pPr/>
+              <a:t>14</a:t>
+            </a:fld>
+            <a:endParaRPr lang="en-US"/>
+          </a:p>
+        </p:txBody>
+      </p:sp>
+    </p:spTree>
+    <p:extLst>
+      <p:ext uri="{BB962C8B-B14F-4D97-AF65-F5344CB8AC3E}">
+        <p14:creationId xmlns:p14="http://schemas.microsoft.com/office/powerpoint/2010/main" val="3904977338"/>
+      </p:ext>
+    </p:extLst>
+  </p:cSld>
+  <p:clrMapOvr>
+    <a:masterClrMapping/>
+  </p:clrMapOvr>
+  <mc:AlternateContent xmlns:mc="http://schemas.openxmlformats.org/markup-compatibility/2006" xmlns:p159="http://schemas.microsoft.com/office/powerpoint/2015/09/main">
+    <mc:Choice Requires="p159">
+      <p:transition xmlns:p14="http://schemas.microsoft.com/office/powerpoint/2010/main" spd="slow" p14:dur="2000">
+        <p159:morph option="byWord"/>
+      </p:transition>
+    </mc:Choice>
+    <mc:Fallback xmlns="">
+      <p:transition spd="slow">
+        <p:fade/>
+      </p:transition>
+    </mc:Fallback>
+  </mc:AlternateContent>
+  <p:timing>
+    <p:tnLst>
+      <p:par>
+        <p:cTn id="1" dur="indefinite" restart="never" nodeType="tmRoot">
+          <p:childTnLst>
+            <p:seq concurrent="1" nextAc="seek">
+              <p:cTn id="2" dur="indefinite" nodeType="mainSeq">
+                <p:childTnLst>
+                  <p:par>
+                    <p:cTn id="3" fill="hold">
+                      <p:stCondLst>
+                        <p:cond delay="indefinite"/>
+                      </p:stCondLst>
+                      <p:childTnLst>
+                        <p:par>
+                          <p:cTn id="4" fill="hold">
+                            <p:stCondLst>
+                              <p:cond delay="0"/>
+                            </p:stCondLst>
+                            <p:childTnLst>
+                              <p:par>
+                                <p:cTn id="5" presetID="10" presetClass="entr" presetSubtype="0" fill="hold" grpId="0" nodeType="clickEffect">
+                                  <p:stCondLst>
+                                    <p:cond delay="0"/>
+                                  </p:stCondLst>
+                                  <p:childTnLst>
+                                    <p:set>
+                                      <p:cBhvr>
+                                        <p:cTn id="6" dur="1" fill="hold">
+                                          <p:stCondLst>
+                                            <p:cond delay="0"/>
+                                          </p:stCondLst>
+                                        </p:cTn>
+                                        <p:tgtEl>
+                                          <p:spTgt spid="3">
+                                            <p:txEl>
+                                              <p:pRg st="1" end="1"/>
+                                            </p:txEl>
+                                          </p:spTgt>
+                                        </p:tgtEl>
+                                        <p:attrNameLst>
+                                          <p:attrName>style.visibility</p:attrName>
+                                        </p:attrNameLst>
+                                      </p:cBhvr>
+                                      <p:to>
+                                        <p:strVal val="visible"/>
+                                      </p:to>
+                                    </p:set>
+                                    <p:animEffect transition="in" filter="fade">
+                                      <p:cBhvr>
+                                        <p:cTn id="7" dur="500"/>
+                                        <p:tgtEl>
+                                          <p:spTgt spid="3">
+                                            <p:txEl>
+                                              <p:pRg st="1" end="1"/>
+                                            </p:txEl>
+                                          </p:spTgt>
+                                        </p:tgtEl>
+                                      </p:cBhvr>
+                                    </p:animEffect>
+                                  </p:childTnLst>
+                                </p:cTn>
+                              </p:par>
+                              <p:par>
+                                <p:cTn id="8" presetID="10" presetClass="entr" presetSubtype="0" fill="hold" grpId="0" nodeType="withEffect">
+                                  <p:stCondLst>
+                                    <p:cond delay="0"/>
+                                  </p:stCondLst>
+                                  <p:childTnLst>
+                                    <p:set>
+                                      <p:cBhvr>
+                                        <p:cTn id="9" dur="1" fill="hold">
+                                          <p:stCondLst>
+                                            <p:cond delay="0"/>
+                                          </p:stCondLst>
+                                        </p:cTn>
+                                        <p:tgtEl>
+                                          <p:spTgt spid="3">
+                                            <p:txEl>
+                                              <p:pRg st="2" end="2"/>
+                                            </p:txEl>
+                                          </p:spTgt>
+                                        </p:tgtEl>
+                                        <p:attrNameLst>
+                                          <p:attrName>style.visibility</p:attrName>
+                                        </p:attrNameLst>
+                                      </p:cBhvr>
+                                      <p:to>
+                                        <p:strVal val="visible"/>
+                                      </p:to>
+                                    </p:set>
+                                    <p:animEffect transition="in" filter="fade">
+                                      <p:cBhvr>
+                                        <p:cTn id="10" dur="500"/>
+                                        <p:tgtEl>
+                                          <p:spTgt spid="3">
+                                            <p:txEl>
+                                              <p:pRg st="2" end="2"/>
+                                            </p:txEl>
+                                          </p:spTgt>
+                                        </p:tgtEl>
+                                      </p:cBhvr>
+                                    </p:animEffect>
+                                  </p:childTnLst>
+                                </p:cTn>
+                              </p:par>
+                            </p:childTnLst>
+                          </p:cTn>
+                        </p:par>
+                      </p:childTnLst>
+                    </p:cTn>
+                  </p:par>
+                </p:childTnLst>
+              </p:cTn>
+              <p:prevCondLst>
+                <p:cond evt="onPrev" delay="0">
+                  <p:tgtEl>
+                    <p:sldTgt/>
+                  </p:tgtEl>
+                </p:cond>
+              </p:prevCondLst>
+              <p:nextCondLst>
+                <p:cond evt="onNext" delay="0">
+                  <p:tgtEl>
+                    <p:sldTgt/>
+                  </p:tgtEl>
+                </p:cond>
+              </p:nextCondLst>
+            </p:seq>
+          </p:childTnLst>
+        </p:cTn>
+      </p:par>
+    </p:tnLst>
+    <p:bldLst>
+      <p:bldP spid="3" grpId="0" build="p"/>
+    </p:bldLst>
+  </p:timing>
+</p:sld>
+</file>
+
+<file path=ppt/slides/slide2.xml><?xml version="1.0" encoding="utf-8"?>
+<p:sld xmlns:a="http://schemas.openxmlformats.org/drawingml/2006/main" xmlns:r="http://schemas.openxmlformats.org/officeDocument/2006/relationships" xmlns:p="http://schemas.openxmlformats.org/presentationml/2006/main">
+  <p:cSld>
+    <p:spTree>
+      <p:nvGrpSpPr>
+        <p:cNvPr id="1" name=""/>
+        <p:cNvGrpSpPr/>
+        <p:nvPr/>
+      </p:nvGrpSpPr>
+      <p:grpSpPr>
+        <a:xfrm>
+          <a:off x="0" y="0"/>
+          <a:ext cx="0" cy="0"/>
+          <a:chOff x="0" y="0"/>
+          <a:chExt cx="0" cy="0"/>
+        </a:xfrm>
+      </p:grpSpPr>
+      <p:sp>
+        <p:nvSpPr>
+          <p:cNvPr id="2" name="Title 1">
+            <a:extLst>
+              <a:ext uri="{FF2B5EF4-FFF2-40B4-BE49-F238E27FC236}">
+                <a16:creationId xmlns:a16="http://schemas.microsoft.com/office/drawing/2014/main" id="{395651AD-D947-8A4B-2EFD-B6CC8B1E0D81}"/>
+              </a:ext>
+            </a:extLst>
+          </p:cNvPr>
+          <p:cNvSpPr>
+            <a:spLocks noGrp="1"/>
+          </p:cNvSpPr>
+          <p:nvPr>
+            <p:ph type="title"/>
+          </p:nvPr>
+        </p:nvSpPr>
+        <p:spPr/>
+        <p:txBody>
+          <a:bodyPr/>
+          <a:lstStyle/>
+          <a:p>
+            <a:r>
+              <a:rPr lang="en-US" dirty="0"/>
+              <a:t>Outline</a:t>
+            </a:r>
+          </a:p>
+        </p:txBody>
+      </p:sp>
+      <p:sp>
+        <p:nvSpPr>
+          <p:cNvPr id="3" name="Content Placeholder 2">
+            <a:extLst>
+              <a:ext uri="{FF2B5EF4-FFF2-40B4-BE49-F238E27FC236}">
+                <a16:creationId xmlns:a16="http://schemas.microsoft.com/office/drawing/2014/main" id="{E84723A2-7B81-D731-A7CE-3D976F404EEF}"/>
+              </a:ext>
+            </a:extLst>
+          </p:cNvPr>
+          <p:cNvSpPr>
+            <a:spLocks noGrp="1"/>
+          </p:cNvSpPr>
+          <p:nvPr>
+            <p:ph idx="1"/>
+          </p:nvPr>
+        </p:nvSpPr>
+        <p:spPr/>
+        <p:txBody>
+          <a:bodyPr vert="horz" lIns="91440" tIns="45720" rIns="91440" bIns="45720" rtlCol="0" anchor="t">
+            <a:noAutofit/>
+          </a:bodyPr>
+          <a:lstStyle/>
+          <a:p>
+            <a:r>
+              <a:rPr lang="en-US" sz="3200" dirty="0"/>
+              <a:t>What is Transfer Learning?</a:t>
+            </a:r>
+          </a:p>
+          <a:p>
+            <a:pPr>
+              <a:buClr>
+                <a:srgbClr val="9E3611"/>
+              </a:buClr>
+            </a:pPr>
+            <a:r>
+              <a:rPr lang="en-US" sz="3200" dirty="0"/>
+              <a:t>Types of Transfer Learning</a:t>
+            </a:r>
+          </a:p>
+          <a:p>
+            <a:pPr>
+              <a:buClr>
+                <a:srgbClr val="9E3611"/>
+              </a:buClr>
+            </a:pPr>
+            <a:r>
+              <a:rPr lang="en-US" sz="3200" dirty="0"/>
+              <a:t>Examples in Practice</a:t>
+            </a:r>
+          </a:p>
+          <a:p>
+            <a:pPr>
+              <a:buClr>
+                <a:srgbClr val="9E3611"/>
+              </a:buClr>
+            </a:pPr>
+            <a:r>
+              <a:rPr lang="en-US" sz="3200" dirty="0"/>
+              <a:t>Advantages of Transfer Learning</a:t>
+            </a:r>
+          </a:p>
+          <a:p>
+            <a:pPr>
+              <a:buClr>
+                <a:srgbClr val="9E3611"/>
+              </a:buClr>
+            </a:pPr>
+            <a:r>
+              <a:rPr lang="en-US" sz="3200" dirty="0"/>
+              <a:t>Challenges and Limitations</a:t>
+            </a:r>
+          </a:p>
+          <a:p>
+            <a:pPr>
+              <a:buClr>
+                <a:srgbClr val="9E3611"/>
+              </a:buClr>
+            </a:pPr>
+            <a:r>
+              <a:rPr lang="en-US" sz="3200" dirty="0"/>
+              <a:t>Code Example</a:t>
+            </a:r>
+          </a:p>
+          <a:p>
+            <a:pPr>
+              <a:buClr>
+                <a:srgbClr val="9E3611"/>
+              </a:buClr>
+            </a:pPr>
+            <a:r>
+              <a:rPr lang="en-US" sz="3200" dirty="0"/>
+              <a:t>Summary and Q&amp;A</a:t>
+            </a:r>
+          </a:p>
+          <a:p>
+            <a:pPr>
+              <a:buClr>
+                <a:srgbClr val="9E3611"/>
+              </a:buClr>
+            </a:pPr>
+            <a:endParaRPr lang="en-US" dirty="0"/>
+          </a:p>
+        </p:txBody>
+      </p:sp>
+      <p:sp>
+        <p:nvSpPr>
+          <p:cNvPr id="4" name="Slide Number Placeholder 3">
+            <a:extLst>
+              <a:ext uri="{FF2B5EF4-FFF2-40B4-BE49-F238E27FC236}">
+                <a16:creationId xmlns:a16="http://schemas.microsoft.com/office/drawing/2014/main" id="{91CB57F5-F38B-1FF1-404E-92B66B4D9D08}"/>
+              </a:ext>
+            </a:extLst>
+          </p:cNvPr>
+          <p:cNvSpPr>
+            <a:spLocks noGrp="1"/>
+          </p:cNvSpPr>
+          <p:nvPr>
+            <p:ph type="sldNum" sz="quarter" idx="12"/>
+          </p:nvPr>
+        </p:nvSpPr>
+        <p:spPr/>
+        <p:txBody>
+          <a:bodyPr/>
+          <a:lstStyle/>
+          <a:p>
+            <a:fld id="{4FAB73BC-B049-4115-A692-8D63A059BFB8}" type="slidenum">
+              <a:rPr lang="en-US" smtClean="0"/>
+              <a:pPr/>
+              <a:t>2</a:t>
+            </a:fld>
+            <a:endParaRPr lang="en-US" dirty="0"/>
+          </a:p>
+        </p:txBody>
+      </p:sp>
+    </p:spTree>
+    <p:extLst>
+      <p:ext uri="{BB962C8B-B14F-4D97-AF65-F5344CB8AC3E}">
+        <p14:creationId xmlns:p14="http://schemas.microsoft.com/office/powerpoint/2010/main" val="941321940"/>
+      </p:ext>
+    </p:extLst>
+  </p:cSld>
+  <p:clrMapOvr>
+    <a:masterClrMapping/>
+  </p:clrMapOvr>
+  <mc:AlternateContent xmlns:mc="http://schemas.openxmlformats.org/markup-compatibility/2006" xmlns:p159="http://schemas.microsoft.com/office/powerpoint/2015/09/main">
+    <mc:Choice Requires="p159">
+      <p:transition xmlns:p14="http://schemas.microsoft.com/office/powerpoint/2010/main" spd="slow" p14:dur="2000">
+        <p159:morph option="byWord"/>
+      </p:transition>
+    </mc:Choice>
+    <mc:Fallback xmlns="">
+      <p:transition spd="slow">
+        <p:fade/>
+      </p:transition>
+    </mc:Fallback>
+  </mc:AlternateContent>
+</p:sld>
+</file>
+
 <file path=ppt/slides/slide3.xml><?xml version="1.0" encoding="utf-8"?>
+<p:sld xmlns:a="http://schemas.openxmlformats.org/drawingml/2006/main" xmlns:r="http://schemas.openxmlformats.org/officeDocument/2006/relationships" xmlns:p="http://schemas.openxmlformats.org/presentationml/2006/main">
+  <p:cSld>
+    <p:spTree>
+      <p:nvGrpSpPr>
+        <p:cNvPr id="1" name=""/>
+        <p:cNvGrpSpPr/>
+        <p:nvPr/>
+      </p:nvGrpSpPr>
+      <p:grpSpPr>
+        <a:xfrm>
+          <a:off x="0" y="0"/>
+          <a:ext cx="0" cy="0"/>
+          <a:chOff x="0" y="0"/>
+          <a:chExt cx="0" cy="0"/>
+        </a:xfrm>
+      </p:grpSpPr>
+      <p:sp>
+        <p:nvSpPr>
+          <p:cNvPr id="2" name="Title 1"/>
+          <p:cNvSpPr>
+            <a:spLocks noGrp="1"/>
+          </p:cNvSpPr>
+          <p:nvPr>
+            <p:ph type="title"/>
+          </p:nvPr>
+        </p:nvSpPr>
+        <p:spPr/>
+        <p:txBody>
+          <a:bodyPr/>
+          <a:lstStyle/>
+          <a:p>
+            <a:r>
+              <a:t>What is Transfer Learning?</a:t>
+            </a:r>
+          </a:p>
+        </p:txBody>
+      </p:sp>
+      <p:sp>
+        <p:nvSpPr>
+          <p:cNvPr id="3" name="Content Placeholder 2"/>
+          <p:cNvSpPr>
+            <a:spLocks noGrp="1"/>
+          </p:cNvSpPr>
+          <p:nvPr>
+            <p:ph idx="1"/>
+          </p:nvPr>
+        </p:nvSpPr>
+        <p:spPr/>
+        <p:txBody>
+          <a:bodyPr>
+            <a:normAutofit/>
+          </a:bodyPr>
+          <a:lstStyle/>
+          <a:p>
+            <a:r>
+              <a:rPr sz="3000" dirty="0"/>
+              <a:t>Transfer Learning is a machine learning technique where a model trained on one task is reused on a different but related task.</a:t>
+            </a:r>
+          </a:p>
+          <a:p>
+            <a:r>
+              <a:rPr sz="3000" dirty="0"/>
+              <a:t>Saves time, resources, and improves performance on tasks with limited data.</a:t>
+            </a:r>
+          </a:p>
+        </p:txBody>
+      </p:sp>
+      <p:sp>
+        <p:nvSpPr>
+          <p:cNvPr id="4" name="Slide Number Placeholder 3">
+            <a:extLst>
+              <a:ext uri="{FF2B5EF4-FFF2-40B4-BE49-F238E27FC236}">
+                <a16:creationId xmlns:a16="http://schemas.microsoft.com/office/drawing/2014/main" id="{0F18CF34-0B36-7D96-10CA-CD58D87BB020}"/>
+              </a:ext>
+            </a:extLst>
+          </p:cNvPr>
+          <p:cNvSpPr>
+            <a:spLocks noGrp="1"/>
+          </p:cNvSpPr>
+          <p:nvPr>
+            <p:ph type="sldNum" sz="quarter" idx="12"/>
+          </p:nvPr>
+        </p:nvSpPr>
+        <p:spPr/>
+        <p:txBody>
+          <a:bodyPr/>
+          <a:lstStyle/>
+          <a:p>
+            <a:fld id="{4FAB73BC-B049-4115-A692-8D63A059BFB8}" type="slidenum">
+              <a:rPr lang="en-US" smtClean="0"/>
+              <a:pPr/>
+              <a:t>3</a:t>
+            </a:fld>
+            <a:endParaRPr lang="en-US"/>
+          </a:p>
+        </p:txBody>
+      </p:sp>
+    </p:spTree>
+  </p:cSld>
+  <p:clrMapOvr>
+    <a:masterClrMapping/>
+  </p:clrMapOvr>
+  <mc:AlternateContent xmlns:mc="http://schemas.openxmlformats.org/markup-compatibility/2006" xmlns:p159="http://schemas.microsoft.com/office/powerpoint/2015/09/main">
+    <mc:Choice Requires="p159">
+      <p:transition xmlns:p14="http://schemas.microsoft.com/office/powerpoint/2010/main" spd="slow" p14:dur="2000">
+        <p159:morph option="byWord"/>
+      </p:transition>
+    </mc:Choice>
+    <mc:Fallback xmlns="">
+      <p:transition spd="slow">
+        <p:fade/>
+      </p:transition>
+    </mc:Fallback>
+  </mc:AlternateContent>
+  <p:timing>
+    <p:tnLst>
+      <p:par>
+        <p:cTn id="1" dur="indefinite" restart="never" nodeType="tmRoot">
+          <p:childTnLst>
+            <p:seq concurrent="1" nextAc="seek">
+              <p:cTn id="2" dur="indefinite" nodeType="mainSeq">
+                <p:childTnLst>
+                  <p:par>
+                    <p:cTn id="3" fill="hold">
+                      <p:stCondLst>
+                        <p:cond delay="indefinite"/>
+                      </p:stCondLst>
+                      <p:childTnLst>
+                        <p:par>
+                          <p:cTn id="4" fill="hold">
+                            <p:stCondLst>
+                              <p:cond delay="0"/>
+                            </p:stCondLst>
+                            <p:childTnLst>
+                              <p:par>
+                                <p:cTn id="5" presetID="2" presetClass="entr" presetSubtype="4" fill="hold" grpId="0" nodeType="clickEffect">
+                                  <p:stCondLst>
+                                    <p:cond delay="0"/>
+                                  </p:stCondLst>
+                                  <p:childTnLst>
+                                    <p:set>
+                                      <p:cBhvr>
+                                        <p:cTn id="6" dur="1" fill="hold">
+                                          <p:stCondLst>
+                                            <p:cond delay="0"/>
+                                          </p:stCondLst>
+                                        </p:cTn>
+                                        <p:tgtEl>
+                                          <p:spTgt spid="3">
+                                            <p:txEl>
+                                              <p:pRg st="0" end="0"/>
+                                            </p:txEl>
+                                          </p:spTgt>
+                                        </p:tgtEl>
+                                        <p:attrNameLst>
+                                          <p:attrName>style.visibility</p:attrName>
+                                        </p:attrNameLst>
+                                      </p:cBhvr>
+                                      <p:to>
+                                        <p:strVal val="visible"/>
+                                      </p:to>
+                                    </p:set>
+                                    <p:anim calcmode="lin" valueType="num">
+                                      <p:cBhvr additive="base">
+                                        <p:cTn id="7" dur="500" fill="hold"/>
+                                        <p:tgtEl>
+                                          <p:spTgt spid="3">
+                                            <p:txEl>
+                                              <p:pRg st="0" end="0"/>
+                                            </p:txEl>
+                                          </p:spTgt>
+                                        </p:tgtEl>
+                                        <p:attrNameLst>
+                                          <p:attrName>ppt_x</p:attrName>
+                                        </p:attrNameLst>
+                                      </p:cBhvr>
+                                      <p:tavLst>
+                                        <p:tav tm="0">
+                                          <p:val>
+                                            <p:strVal val="#ppt_x"/>
+                                          </p:val>
+                                        </p:tav>
+                                        <p:tav tm="100000">
+                                          <p:val>
+                                            <p:strVal val="#ppt_x"/>
+                                          </p:val>
+                                        </p:tav>
+                                      </p:tavLst>
+                                    </p:anim>
+                                    <p:anim calcmode="lin" valueType="num">
+                                      <p:cBhvr additive="base">
+                                        <p:cTn id="8" dur="500" fill="hold"/>
+                                        <p:tgtEl>
+                                          <p:spTgt spid="3">
+                                            <p:txEl>
+                                              <p:pRg st="0" end="0"/>
+                                            </p:txEl>
+                                          </p:spTgt>
+                                        </p:tgtEl>
+                                        <p:attrNameLst>
+                                          <p:attrName>ppt_y</p:attrName>
+                                        </p:attrNameLst>
+                                      </p:cBhvr>
+                                      <p:tavLst>
+                                        <p:tav tm="0">
+                                          <p:val>
+                                            <p:strVal val="1+#ppt_h/2"/>
+                                          </p:val>
+                                        </p:tav>
+                                        <p:tav tm="100000">
+                                          <p:val>
+                                            <p:strVal val="#ppt_y"/>
+                                          </p:val>
+                                        </p:tav>
+                                      </p:tavLst>
+                                    </p:anim>
+                                  </p:childTnLst>
+                                </p:cTn>
+                              </p:par>
+                            </p:childTnLst>
+                          </p:cTn>
+                        </p:par>
+                      </p:childTnLst>
+                    </p:cTn>
+                  </p:par>
+                  <p:par>
+                    <p:cTn id="9" fill="hold">
+                      <p:stCondLst>
+                        <p:cond delay="indefinite"/>
+                      </p:stCondLst>
+                      <p:childTnLst>
+                        <p:par>
+                          <p:cTn id="10" fill="hold">
+                            <p:stCondLst>
+                              <p:cond delay="0"/>
+                            </p:stCondLst>
+                            <p:childTnLst>
+                              <p:par>
+                                <p:cTn id="11" presetID="2" presetClass="entr" presetSubtype="4" fill="hold" grpId="0" nodeType="clickEffect">
+                                  <p:stCondLst>
+                                    <p:cond delay="0"/>
+                                  </p:stCondLst>
+                                  <p:childTnLst>
+                                    <p:set>
+                                      <p:cBhvr>
+                                        <p:cTn id="12" dur="1" fill="hold">
+                                          <p:stCondLst>
+                                            <p:cond delay="0"/>
+                                          </p:stCondLst>
+                                        </p:cTn>
+                                        <p:tgtEl>
+                                          <p:spTgt spid="3">
+                                            <p:txEl>
+                                              <p:pRg st="1" end="1"/>
+                                            </p:txEl>
+                                          </p:spTgt>
+                                        </p:tgtEl>
+                                        <p:attrNameLst>
+                                          <p:attrName>style.visibility</p:attrName>
+                                        </p:attrNameLst>
+                                      </p:cBhvr>
+                                      <p:to>
+                                        <p:strVal val="visible"/>
+                                      </p:to>
+                                    </p:set>
+                                    <p:anim calcmode="lin" valueType="num">
+                                      <p:cBhvr additive="base">
+                                        <p:cTn id="13" dur="500" fill="hold"/>
+                                        <p:tgtEl>
+                                          <p:spTgt spid="3">
+                                            <p:txEl>
+                                              <p:pRg st="1" end="1"/>
+                                            </p:txEl>
+                                          </p:spTgt>
+                                        </p:tgtEl>
+                                        <p:attrNameLst>
+                                          <p:attrName>ppt_x</p:attrName>
+                                        </p:attrNameLst>
+                                      </p:cBhvr>
+                                      <p:tavLst>
+                                        <p:tav tm="0">
+                                          <p:val>
+                                            <p:strVal val="#ppt_x"/>
+                                          </p:val>
+                                        </p:tav>
+                                        <p:tav tm="100000">
+                                          <p:val>
+                                            <p:strVal val="#ppt_x"/>
+                                          </p:val>
+                                        </p:tav>
+                                      </p:tavLst>
+                                    </p:anim>
+                                    <p:anim calcmode="lin" valueType="num">
+                                      <p:cBhvr additive="base">
+                                        <p:cTn id="14" dur="500" fill="hold"/>
+                                        <p:tgtEl>
+                                          <p:spTgt spid="3">
+                                            <p:txEl>
+                                              <p:pRg st="1" end="1"/>
+                                            </p:txEl>
+                                          </p:spTgt>
+                                        </p:tgtEl>
+                                        <p:attrNameLst>
+                                          <p:attrName>ppt_y</p:attrName>
+                                        </p:attrNameLst>
+                                      </p:cBhvr>
+                                      <p:tavLst>
+                                        <p:tav tm="0">
+                                          <p:val>
+                                            <p:strVal val="1+#ppt_h/2"/>
+                                          </p:val>
+                                        </p:tav>
+                                        <p:tav tm="100000">
+                                          <p:val>
+                                            <p:strVal val="#ppt_y"/>
+                                          </p:val>
+                                        </p:tav>
+                                      </p:tavLst>
+                                    </p:anim>
+                                  </p:childTnLst>
+                                </p:cTn>
+                              </p:par>
+                            </p:childTnLst>
+                          </p:cTn>
+                        </p:par>
+                      </p:childTnLst>
+                    </p:cTn>
+                  </p:par>
+                </p:childTnLst>
+              </p:cTn>
+              <p:prevCondLst>
+                <p:cond evt="onPrev" delay="0">
+                  <p:tgtEl>
+                    <p:sldTgt/>
+                  </p:tgtEl>
+                </p:cond>
+              </p:prevCondLst>
+              <p:nextCondLst>
+                <p:cond evt="onNext" delay="0">
+                  <p:tgtEl>
+                    <p:sldTgt/>
+                  </p:tgtEl>
+                </p:cond>
+              </p:nextCondLst>
+            </p:seq>
+          </p:childTnLst>
+        </p:cTn>
+      </p:par>
+    </p:tnLst>
+    <p:bldLst>
+      <p:bldP spid="3" grpId="0" build="p"/>
+    </p:bldLst>
+  </p:timing>
+</p:sld>
+</file>
+
+<file path=ppt/slides/slide4.xml><?xml version="1.0" encoding="utf-8"?>
 <p:sld xmlns:a="http://schemas.openxmlformats.org/drawingml/2006/main" xmlns:r="http://schemas.openxmlformats.org/officeDocument/2006/relationships" xmlns:p="http://schemas.openxmlformats.org/presentationml/2006/main">
   <p:cSld>
     <p:spTree>
@@ -4972,7 +6644,7 @@
             <a:fld id="{4FAB73BC-B049-4115-A692-8D63A059BFB8}" type="slidenum">
               <a:rPr lang="en-US" smtClean="0"/>
               <a:pPr/>
-              <a:t>3</a:t>
+              <a:t>4</a:t>
             </a:fld>
             <a:endParaRPr lang="en-US"/>
           </a:p>
@@ -4984,151 +6656,6 @@
         <p14:creationId xmlns:p14="http://schemas.microsoft.com/office/powerpoint/2010/main" val="2569323210"/>
       </p:ext>
     </p:extLst>
-  </p:cSld>
-  <p:clrMapOvr>
-    <a:masterClrMapping/>
-  </p:clrMapOvr>
-  <mc:AlternateContent xmlns:mc="http://schemas.openxmlformats.org/markup-compatibility/2006" xmlns:p159="http://schemas.microsoft.com/office/powerpoint/2015/09/main">
-    <mc:Choice Requires="p159">
-      <p:transition xmlns:p14="http://schemas.microsoft.com/office/powerpoint/2010/main" spd="slow" p14:dur="2000">
-        <p159:morph option="byWord"/>
-      </p:transition>
-    </mc:Choice>
-    <mc:Fallback xmlns="">
-      <p:transition spd="slow">
-        <p:fade/>
-      </p:transition>
-    </mc:Fallback>
-  </mc:AlternateContent>
-</p:sld>
-</file>
-
-<file path=ppt/slides/slide4.xml><?xml version="1.0" encoding="utf-8"?>
-<p:sld xmlns:a="http://schemas.openxmlformats.org/drawingml/2006/main" xmlns:r="http://schemas.openxmlformats.org/officeDocument/2006/relationships" xmlns:p="http://schemas.openxmlformats.org/presentationml/2006/main">
-  <p:cSld>
-    <p:spTree>
-      <p:nvGrpSpPr>
-        <p:cNvPr id="1" name=""/>
-        <p:cNvGrpSpPr/>
-        <p:nvPr/>
-      </p:nvGrpSpPr>
-      <p:grpSpPr>
-        <a:xfrm>
-          <a:off x="0" y="0"/>
-          <a:ext cx="0" cy="0"/>
-          <a:chOff x="0" y="0"/>
-          <a:chExt cx="0" cy="0"/>
-        </a:xfrm>
-      </p:grpSpPr>
-      <p:sp>
-        <p:nvSpPr>
-          <p:cNvPr id="2" name="Title 1"/>
-          <p:cNvSpPr>
-            <a:spLocks noGrp="1"/>
-          </p:cNvSpPr>
-          <p:nvPr>
-            <p:ph type="title"/>
-          </p:nvPr>
-        </p:nvSpPr>
-        <p:spPr/>
-        <p:txBody>
-          <a:bodyPr/>
-          <a:lstStyle/>
-          <a:p>
-            <a:r>
-              <a:t>Types of Transfer Learning</a:t>
-            </a:r>
-          </a:p>
-        </p:txBody>
-      </p:sp>
-      <p:sp>
-        <p:nvSpPr>
-          <p:cNvPr id="3" name="Content Placeholder 2"/>
-          <p:cNvSpPr>
-            <a:spLocks noGrp="1"/>
-          </p:cNvSpPr>
-          <p:nvPr>
-            <p:ph idx="1"/>
-          </p:nvPr>
-        </p:nvSpPr>
-        <p:spPr/>
-        <p:txBody>
-          <a:bodyPr>
-            <a:normAutofit/>
-          </a:bodyPr>
-          <a:lstStyle/>
-          <a:p>
-            <a:r>
-              <a:rPr sz="3000" b="1" dirty="0"/>
-              <a:t>Domain Adaptation</a:t>
-            </a:r>
-            <a:r>
-              <a:rPr sz="3000" dirty="0"/>
-              <a:t>: Adapting a model from one domain to another (e.g., text translation).</a:t>
-            </a:r>
-            <a:endParaRPr lang="en-GB" sz="3000" dirty="0"/>
-          </a:p>
-          <a:p>
-            <a:r>
-              <a:rPr sz="3000" b="1" dirty="0"/>
-              <a:t>Task Transfer</a:t>
-            </a:r>
-            <a:r>
-              <a:rPr sz="3000" dirty="0"/>
-              <a:t>: Applying knowledge from one task to another (e.g., image classification to object detection).</a:t>
-            </a:r>
-          </a:p>
-          <a:p>
-            <a:r>
-              <a:rPr sz="3000" b="1" dirty="0"/>
-              <a:t>Model Reuse</a:t>
-            </a:r>
-            <a:r>
-              <a:rPr sz="3000" dirty="0"/>
-              <a:t>: Using </a:t>
-            </a:r>
-            <a:r>
-              <a:rPr lang="en-GB" sz="3000" dirty="0"/>
-              <a:t>pre-trained</a:t>
-            </a:r>
-            <a:r>
-              <a:rPr sz="3000" dirty="0"/>
-              <a:t> models as a starting point.</a:t>
-            </a:r>
-          </a:p>
-        </p:txBody>
-      </p:sp>
-      <p:sp>
-        <p:nvSpPr>
-          <p:cNvPr id="4" name="Slide Number Placeholder 3">
-            <a:extLst>
-              <a:ext uri="{FF2B5EF4-FFF2-40B4-BE49-F238E27FC236}">
-                <a16:creationId xmlns:a16="http://schemas.microsoft.com/office/drawing/2014/main" id="{C2EA66F2-5E95-3730-6DE5-E148AADC8914}"/>
-              </a:ext>
-            </a:extLst>
-          </p:cNvPr>
-          <p:cNvSpPr>
-            <a:spLocks noGrp="1"/>
-          </p:cNvSpPr>
-          <p:nvPr>
-            <p:ph type="sldNum" sz="quarter" idx="12"/>
-          </p:nvPr>
-        </p:nvSpPr>
-        <p:spPr/>
-        <p:txBody>
-          <a:bodyPr/>
-          <a:lstStyle/>
-          <a:p>
-            <a:fld id="{4FAB73BC-B049-4115-A692-8D63A059BFB8}" type="slidenum">
-              <a:rPr lang="en-US" smtClean="0"/>
-              <a:pPr/>
-              <a:t>4</a:t>
-            </a:fld>
-            <a:endParaRPr lang="en-US"/>
-          </a:p>
-        </p:txBody>
-      </p:sp>
-    </p:spTree>
   </p:cSld>
   <p:clrMapOvr>
     <a:masterClrMapping/>
@@ -5181,7 +6708,7 @@
           <a:lstStyle/>
           <a:p>
             <a:r>
-              <a:t>Examples in Practice</a:t>
+              <a:t>Types of Transfer Learning</a:t>
             </a:r>
           </a:p>
         </p:txBody>
@@ -5204,40 +6731,41 @@
           <a:lstStyle/>
           <a:p>
             <a:r>
-              <a:rPr sz="3200" b="1" dirty="0"/>
-              <a:t>Computer Vision</a:t>
-            </a:r>
-            <a:r>
-              <a:rPr sz="3200" dirty="0"/>
-              <a:t>: </a:t>
-            </a:r>
-            <a:r>
-              <a:rPr lang="en-GB" sz="3200" dirty="0"/>
-              <a:t>Pre-trained</a:t>
-            </a:r>
-            <a:r>
-              <a:rPr sz="3200" dirty="0"/>
-              <a:t> CNNs for object detection.</a:t>
-            </a:r>
-          </a:p>
-          <a:p>
-            <a:r>
-              <a:rPr sz="3200" b="1" dirty="0"/>
-              <a:t>NLP</a:t>
-            </a:r>
-            <a:r>
-              <a:rPr sz="3200" dirty="0"/>
-              <a:t>: BERT, GPT for text classification and summarization.</a:t>
-            </a:r>
-          </a:p>
-          <a:p>
-            <a:r>
-              <a:rPr sz="3200" b="1" dirty="0"/>
-              <a:t>Healthcare</a:t>
-            </a:r>
-            <a:r>
-              <a:rPr sz="3200" dirty="0"/>
-              <a:t>: Transfer learning for rare disease diagnosis using limited datasets.</a:t>
+              <a:rPr sz="3000" b="1" dirty="0"/>
+              <a:t>Domain Adaptation</a:t>
+            </a:r>
+            <a:r>
+              <a:rPr sz="3000" dirty="0"/>
+              <a:t>: Adapting a model from one domain to another (e.g., text translation).</a:t>
+            </a:r>
+            <a:endParaRPr lang="en-GB" sz="3000" dirty="0"/>
+          </a:p>
+          <a:p>
+            <a:r>
+              <a:rPr sz="3000" b="1" dirty="0"/>
+              <a:t>Task Transfer</a:t>
+            </a:r>
+            <a:r>
+              <a:rPr sz="3000" dirty="0"/>
+              <a:t>: Applying knowledge from one task to another (e.g., image classification to object detection).</a:t>
+            </a:r>
+          </a:p>
+          <a:p>
+            <a:r>
+              <a:rPr sz="3000" b="1" dirty="0"/>
+              <a:t>Model Reuse</a:t>
+            </a:r>
+            <a:r>
+              <a:rPr sz="3000" dirty="0"/>
+              <a:t>: Using </a:t>
+            </a:r>
+            <a:r>
+              <a:rPr lang="en-GB" sz="3000" dirty="0"/>
+              <a:t>pre-trained</a:t>
+            </a:r>
+            <a:r>
+              <a:rPr sz="3000" dirty="0"/>
+              <a:t> models as a starting point.</a:t>
             </a:r>
           </a:p>
         </p:txBody>
@@ -5247,7 +6775,7 @@
           <p:cNvPr id="4" name="Slide Number Placeholder 3">
             <a:extLst>
               <a:ext uri="{FF2B5EF4-FFF2-40B4-BE49-F238E27FC236}">
-                <a16:creationId xmlns:a16="http://schemas.microsoft.com/office/drawing/2014/main" id="{839CF8C7-B6F1-BB99-D089-BAAA53AE6F54}"/>
+                <a16:creationId xmlns:a16="http://schemas.microsoft.com/office/drawing/2014/main" id="{C2EA66F2-5E95-3730-6DE5-E148AADC8914}"/>
               </a:ext>
             </a:extLst>
           </p:cNvPr>
@@ -5289,12 +6817,405 @@
       </p:transition>
     </mc:Fallback>
   </mc:AlternateContent>
+  <p:timing>
+    <p:tnLst>
+      <p:par>
+        <p:cTn id="1" dur="indefinite" restart="never" nodeType="tmRoot">
+          <p:childTnLst>
+            <p:seq concurrent="1" nextAc="seek">
+              <p:cTn id="2" dur="indefinite" nodeType="mainSeq">
+                <p:childTnLst>
+                  <p:par>
+                    <p:cTn id="3" fill="hold">
+                      <p:stCondLst>
+                        <p:cond delay="indefinite"/>
+                      </p:stCondLst>
+                      <p:childTnLst>
+                        <p:par>
+                          <p:cTn id="4" fill="hold">
+                            <p:stCondLst>
+                              <p:cond delay="0"/>
+                            </p:stCondLst>
+                            <p:childTnLst>
+                              <p:par>
+                                <p:cTn id="5" presetID="2" presetClass="entr" presetSubtype="4" fill="hold" grpId="0" nodeType="clickEffect">
+                                  <p:stCondLst>
+                                    <p:cond delay="0"/>
+                                  </p:stCondLst>
+                                  <p:childTnLst>
+                                    <p:set>
+                                      <p:cBhvr>
+                                        <p:cTn id="6" dur="1" fill="hold">
+                                          <p:stCondLst>
+                                            <p:cond delay="0"/>
+                                          </p:stCondLst>
+                                        </p:cTn>
+                                        <p:tgtEl>
+                                          <p:spTgt spid="3">
+                                            <p:txEl>
+                                              <p:pRg st="0" end="0"/>
+                                            </p:txEl>
+                                          </p:spTgt>
+                                        </p:tgtEl>
+                                        <p:attrNameLst>
+                                          <p:attrName>style.visibility</p:attrName>
+                                        </p:attrNameLst>
+                                      </p:cBhvr>
+                                      <p:to>
+                                        <p:strVal val="visible"/>
+                                      </p:to>
+                                    </p:set>
+                                    <p:anim calcmode="lin" valueType="num">
+                                      <p:cBhvr additive="base">
+                                        <p:cTn id="7" dur="500" fill="hold"/>
+                                        <p:tgtEl>
+                                          <p:spTgt spid="3">
+                                            <p:txEl>
+                                              <p:pRg st="0" end="0"/>
+                                            </p:txEl>
+                                          </p:spTgt>
+                                        </p:tgtEl>
+                                        <p:attrNameLst>
+                                          <p:attrName>ppt_x</p:attrName>
+                                        </p:attrNameLst>
+                                      </p:cBhvr>
+                                      <p:tavLst>
+                                        <p:tav tm="0">
+                                          <p:val>
+                                            <p:strVal val="#ppt_x"/>
+                                          </p:val>
+                                        </p:tav>
+                                        <p:tav tm="100000">
+                                          <p:val>
+                                            <p:strVal val="#ppt_x"/>
+                                          </p:val>
+                                        </p:tav>
+                                      </p:tavLst>
+                                    </p:anim>
+                                    <p:anim calcmode="lin" valueType="num">
+                                      <p:cBhvr additive="base">
+                                        <p:cTn id="8" dur="500" fill="hold"/>
+                                        <p:tgtEl>
+                                          <p:spTgt spid="3">
+                                            <p:txEl>
+                                              <p:pRg st="0" end="0"/>
+                                            </p:txEl>
+                                          </p:spTgt>
+                                        </p:tgtEl>
+                                        <p:attrNameLst>
+                                          <p:attrName>ppt_y</p:attrName>
+                                        </p:attrNameLst>
+                                      </p:cBhvr>
+                                      <p:tavLst>
+                                        <p:tav tm="0">
+                                          <p:val>
+                                            <p:strVal val="1+#ppt_h/2"/>
+                                          </p:val>
+                                        </p:tav>
+                                        <p:tav tm="100000">
+                                          <p:val>
+                                            <p:strVal val="#ppt_y"/>
+                                          </p:val>
+                                        </p:tav>
+                                      </p:tavLst>
+                                    </p:anim>
+                                  </p:childTnLst>
+                                </p:cTn>
+                              </p:par>
+                            </p:childTnLst>
+                          </p:cTn>
+                        </p:par>
+                      </p:childTnLst>
+                    </p:cTn>
+                  </p:par>
+                  <p:par>
+                    <p:cTn id="9" fill="hold">
+                      <p:stCondLst>
+                        <p:cond delay="indefinite"/>
+                      </p:stCondLst>
+                      <p:childTnLst>
+                        <p:par>
+                          <p:cTn id="10" fill="hold">
+                            <p:stCondLst>
+                              <p:cond delay="0"/>
+                            </p:stCondLst>
+                            <p:childTnLst>
+                              <p:par>
+                                <p:cTn id="11" presetID="37" presetClass="entr" presetSubtype="0" fill="hold" grpId="0" nodeType="clickEffect">
+                                  <p:stCondLst>
+                                    <p:cond delay="0"/>
+                                  </p:stCondLst>
+                                  <p:childTnLst>
+                                    <p:set>
+                                      <p:cBhvr>
+                                        <p:cTn id="12" dur="1" fill="hold">
+                                          <p:stCondLst>
+                                            <p:cond delay="0"/>
+                                          </p:stCondLst>
+                                        </p:cTn>
+                                        <p:tgtEl>
+                                          <p:spTgt spid="3">
+                                            <p:txEl>
+                                              <p:pRg st="1" end="1"/>
+                                            </p:txEl>
+                                          </p:spTgt>
+                                        </p:tgtEl>
+                                        <p:attrNameLst>
+                                          <p:attrName>style.visibility</p:attrName>
+                                        </p:attrNameLst>
+                                      </p:cBhvr>
+                                      <p:to>
+                                        <p:strVal val="visible"/>
+                                      </p:to>
+                                    </p:set>
+                                    <p:animEffect transition="in" filter="fade">
+                                      <p:cBhvr>
+                                        <p:cTn id="13" dur="1000"/>
+                                        <p:tgtEl>
+                                          <p:spTgt spid="3">
+                                            <p:txEl>
+                                              <p:pRg st="1" end="1"/>
+                                            </p:txEl>
+                                          </p:spTgt>
+                                        </p:tgtEl>
+                                      </p:cBhvr>
+                                    </p:animEffect>
+                                    <p:anim calcmode="lin" valueType="num">
+                                      <p:cBhvr>
+                                        <p:cTn id="14" dur="1000" fill="hold"/>
+                                        <p:tgtEl>
+                                          <p:spTgt spid="3">
+                                            <p:txEl>
+                                              <p:pRg st="1" end="1"/>
+                                            </p:txEl>
+                                          </p:spTgt>
+                                        </p:tgtEl>
+                                        <p:attrNameLst>
+                                          <p:attrName>ppt_x</p:attrName>
+                                        </p:attrNameLst>
+                                      </p:cBhvr>
+                                      <p:tavLst>
+                                        <p:tav tm="0">
+                                          <p:val>
+                                            <p:strVal val="#ppt_x"/>
+                                          </p:val>
+                                        </p:tav>
+                                        <p:tav tm="100000">
+                                          <p:val>
+                                            <p:strVal val="#ppt_x"/>
+                                          </p:val>
+                                        </p:tav>
+                                      </p:tavLst>
+                                    </p:anim>
+                                    <p:anim calcmode="lin" valueType="num">
+                                      <p:cBhvr>
+                                        <p:cTn id="15" dur="900" decel="100000" fill="hold"/>
+                                        <p:tgtEl>
+                                          <p:spTgt spid="3">
+                                            <p:txEl>
+                                              <p:pRg st="1" end="1"/>
+                                            </p:txEl>
+                                          </p:spTgt>
+                                        </p:tgtEl>
+                                        <p:attrNameLst>
+                                          <p:attrName>ppt_y</p:attrName>
+                                        </p:attrNameLst>
+                                      </p:cBhvr>
+                                      <p:tavLst>
+                                        <p:tav tm="0">
+                                          <p:val>
+                                            <p:strVal val="#ppt_y+1"/>
+                                          </p:val>
+                                        </p:tav>
+                                        <p:tav tm="100000">
+                                          <p:val>
+                                            <p:strVal val="#ppt_y-.03"/>
+                                          </p:val>
+                                        </p:tav>
+                                      </p:tavLst>
+                                    </p:anim>
+                                    <p:anim calcmode="lin" valueType="num">
+                                      <p:cBhvr>
+                                        <p:cTn id="16" dur="100" accel="100000" fill="hold">
+                                          <p:stCondLst>
+                                            <p:cond delay="900"/>
+                                          </p:stCondLst>
+                                        </p:cTn>
+                                        <p:tgtEl>
+                                          <p:spTgt spid="3">
+                                            <p:txEl>
+                                              <p:pRg st="1" end="1"/>
+                                            </p:txEl>
+                                          </p:spTgt>
+                                        </p:tgtEl>
+                                        <p:attrNameLst>
+                                          <p:attrName>ppt_y</p:attrName>
+                                        </p:attrNameLst>
+                                      </p:cBhvr>
+                                      <p:tavLst>
+                                        <p:tav tm="0">
+                                          <p:val>
+                                            <p:strVal val="#ppt_y-.03"/>
+                                          </p:val>
+                                        </p:tav>
+                                        <p:tav tm="100000">
+                                          <p:val>
+                                            <p:strVal val="#ppt_y"/>
+                                          </p:val>
+                                        </p:tav>
+                                      </p:tavLst>
+                                    </p:anim>
+                                  </p:childTnLst>
+                                </p:cTn>
+                              </p:par>
+                            </p:childTnLst>
+                          </p:cTn>
+                        </p:par>
+                      </p:childTnLst>
+                    </p:cTn>
+                  </p:par>
+                  <p:par>
+                    <p:cTn id="17" fill="hold">
+                      <p:stCondLst>
+                        <p:cond delay="indefinite"/>
+                      </p:stCondLst>
+                      <p:childTnLst>
+                        <p:par>
+                          <p:cTn id="18" fill="hold">
+                            <p:stCondLst>
+                              <p:cond delay="0"/>
+                            </p:stCondLst>
+                            <p:childTnLst>
+                              <p:par>
+                                <p:cTn id="19" presetID="2" presetClass="entr" presetSubtype="4" fill="hold" grpId="0" nodeType="clickEffect">
+                                  <p:stCondLst>
+                                    <p:cond delay="0"/>
+                                  </p:stCondLst>
+                                  <p:childTnLst>
+                                    <p:set>
+                                      <p:cBhvr>
+                                        <p:cTn id="20" dur="1" fill="hold">
+                                          <p:stCondLst>
+                                            <p:cond delay="0"/>
+                                          </p:stCondLst>
+                                        </p:cTn>
+                                        <p:tgtEl>
+                                          <p:spTgt spid="3">
+                                            <p:txEl>
+                                              <p:pRg st="2" end="2"/>
+                                            </p:txEl>
+                                          </p:spTgt>
+                                        </p:tgtEl>
+                                        <p:attrNameLst>
+                                          <p:attrName>style.visibility</p:attrName>
+                                        </p:attrNameLst>
+                                      </p:cBhvr>
+                                      <p:to>
+                                        <p:strVal val="visible"/>
+                                      </p:to>
+                                    </p:set>
+                                    <p:anim calcmode="lin" valueType="num">
+                                      <p:cBhvr additive="base">
+                                        <p:cTn id="21" dur="500" fill="hold"/>
+                                        <p:tgtEl>
+                                          <p:spTgt spid="3">
+                                            <p:txEl>
+                                              <p:pRg st="2" end="2"/>
+                                            </p:txEl>
+                                          </p:spTgt>
+                                        </p:tgtEl>
+                                        <p:attrNameLst>
+                                          <p:attrName>ppt_x</p:attrName>
+                                        </p:attrNameLst>
+                                      </p:cBhvr>
+                                      <p:tavLst>
+                                        <p:tav tm="0">
+                                          <p:val>
+                                            <p:strVal val="#ppt_x"/>
+                                          </p:val>
+                                        </p:tav>
+                                        <p:tav tm="100000">
+                                          <p:val>
+                                            <p:strVal val="#ppt_x"/>
+                                          </p:val>
+                                        </p:tav>
+                                      </p:tavLst>
+                                    </p:anim>
+                                    <p:anim calcmode="lin" valueType="num">
+                                      <p:cBhvr additive="base">
+                                        <p:cTn id="22" dur="500" fill="hold"/>
+                                        <p:tgtEl>
+                                          <p:spTgt spid="3">
+                                            <p:txEl>
+                                              <p:pRg st="2" end="2"/>
+                                            </p:txEl>
+                                          </p:spTgt>
+                                        </p:tgtEl>
+                                        <p:attrNameLst>
+                                          <p:attrName>ppt_y</p:attrName>
+                                        </p:attrNameLst>
+                                      </p:cBhvr>
+                                      <p:tavLst>
+                                        <p:tav tm="0">
+                                          <p:val>
+                                            <p:strVal val="1+#ppt_h/2"/>
+                                          </p:val>
+                                        </p:tav>
+                                        <p:tav tm="100000">
+                                          <p:val>
+                                            <p:strVal val="#ppt_y"/>
+                                          </p:val>
+                                        </p:tav>
+                                      </p:tavLst>
+                                    </p:anim>
+                                  </p:childTnLst>
+                                </p:cTn>
+                              </p:par>
+                            </p:childTnLst>
+                          </p:cTn>
+                        </p:par>
+                      </p:childTnLst>
+                    </p:cTn>
+                  </p:par>
+                </p:childTnLst>
+              </p:cTn>
+              <p:prevCondLst>
+                <p:cond evt="onPrev" delay="0">
+                  <p:tgtEl>
+                    <p:sldTgt/>
+                  </p:tgtEl>
+                </p:cond>
+              </p:prevCondLst>
+              <p:nextCondLst>
+                <p:cond evt="onNext" delay="0">
+                  <p:tgtEl>
+                    <p:sldTgt/>
+                  </p:tgtEl>
+                </p:cond>
+              </p:nextCondLst>
+            </p:seq>
+          </p:childTnLst>
+        </p:cTn>
+      </p:par>
+    </p:tnLst>
+    <p:bldLst>
+      <p:bldP spid="3" grpId="0" build="p"/>
+    </p:bldLst>
+  </p:timing>
 </p:sld>
 </file>
 
 <file path=ppt/slides/slide6.xml><?xml version="1.0" encoding="utf-8"?>
 <p:sld xmlns:a="http://schemas.openxmlformats.org/drawingml/2006/main" xmlns:r="http://schemas.openxmlformats.org/officeDocument/2006/relationships" xmlns:p="http://schemas.openxmlformats.org/presentationml/2006/main">
   <p:cSld>
+    <p:bg>
+      <p:bgPr>
+        <a:solidFill>
+          <a:schemeClr val="bg1"/>
+        </a:solidFill>
+        <a:effectLst/>
+      </p:bgPr>
+    </p:bg>
     <p:spTree>
       <p:nvGrpSpPr>
         <p:cNvPr id="1" name=""/>
@@ -5309,100 +7230,226 @@
           <a:chExt cx="0" cy="0"/>
         </a:xfrm>
       </p:grpSpPr>
-      <p:sp>
-        <p:nvSpPr>
-          <p:cNvPr id="2" name="Title 1"/>
-          <p:cNvSpPr>
-            <a:spLocks noGrp="1"/>
-          </p:cNvSpPr>
-          <p:nvPr>
-            <p:ph type="title"/>
-          </p:nvPr>
-        </p:nvSpPr>
-        <p:spPr/>
-        <p:txBody>
-          <a:bodyPr/>
-          <a:lstStyle/>
-          <a:p>
-            <a:r>
-              <a:t>Advantages of Transfer Learning</a:t>
-            </a:r>
-          </a:p>
-        </p:txBody>
-      </p:sp>
-      <p:sp>
-        <p:nvSpPr>
-          <p:cNvPr id="3" name="Content Placeholder 2"/>
-          <p:cNvSpPr>
-            <a:spLocks noGrp="1"/>
-          </p:cNvSpPr>
-          <p:nvPr>
-            <p:ph idx="1"/>
-          </p:nvPr>
-        </p:nvSpPr>
-        <p:spPr/>
-        <p:txBody>
-          <a:bodyPr>
+      <p:grpSp>
+        <p:nvGrpSpPr>
+          <p:cNvPr id="33" name="Group 32">
+            <a:extLst>
+              <a:ext uri="{FF2B5EF4-FFF2-40B4-BE49-F238E27FC236}">
+                <a16:creationId xmlns:a16="http://schemas.microsoft.com/office/drawing/2014/main" id="{2A313B03-D361-4EC9-AF52-0B3C1C92C26D}"/>
+              </a:ext>
+              <a:ext uri="{C183D7F6-B498-43B3-948B-1728B52AA6E4}">
+                <adec:decorative xmlns:adec="http://schemas.microsoft.com/office/drawing/2017/decorative" val="1"/>
+              </a:ext>
+            </a:extLst>
+          </p:cNvPr>
+          <p:cNvGrpSpPr>
+            <a:grpSpLocks noGrp="1" noUngrp="1" noRot="1" noChangeAspect="1" noMove="1" noResize="1"/>
+          </p:cNvGrpSpPr>
+          <p:nvPr>
+            <p:extLst>
+              <p:ext uri="{386F3935-93C4-4BCD-93E2-E3B085C9AB24}">
+                <p16:designElem xmlns:p16="http://schemas.microsoft.com/office/powerpoint/2015/main" val="1"/>
+              </p:ext>
+            </p:extLst>
+          </p:nvPr>
+        </p:nvGrpSpPr>
+        <p:grpSpPr>
+          <a:xfrm>
+            <a:off x="8551293" y="6229681"/>
+            <a:ext cx="342900" cy="457200"/>
+            <a:chOff x="11361456" y="6195813"/>
+            <a:chExt cx="548640" cy="548640"/>
+          </a:xfrm>
+        </p:grpSpPr>
+        <p:sp>
+          <p:nvSpPr>
+            <p:cNvPr id="22" name="Oval 21">
+              <a:extLst>
+                <a:ext uri="{FF2B5EF4-FFF2-40B4-BE49-F238E27FC236}">
+                  <a16:creationId xmlns:a16="http://schemas.microsoft.com/office/drawing/2014/main" id="{5E79CB85-A08A-4579-86F6-A8AA97551B88}"/>
+                </a:ext>
+                <a:ext uri="{C183D7F6-B498-43B3-948B-1728B52AA6E4}">
+                  <adec:decorative xmlns:adec="http://schemas.microsoft.com/office/drawing/2017/decorative" val="1"/>
+                </a:ext>
+              </a:extLst>
+            </p:cNvPr>
+            <p:cNvSpPr/>
+            <p:nvPr>
+              <p:extLst>
+                <p:ext uri="{386F3935-93C4-4BCD-93E2-E3B085C9AB24}">
+                  <p16:designElem xmlns:p16="http://schemas.microsoft.com/office/powerpoint/2015/main" val="1"/>
+                </p:ext>
+              </p:extLst>
+            </p:nvPr>
+          </p:nvSpPr>
+          <p:spPr>
+            <a:xfrm>
+              <a:off x="11361456" y="6195813"/>
+              <a:ext cx="548640" cy="548640"/>
+            </a:xfrm>
+            <a:prstGeom prst="ellipse">
+              <a:avLst/>
+            </a:prstGeom>
+            <a:blipFill dpi="0" rotWithShape="1">
+              <a:blip r:embed="rId2">
+                <a:duotone>
+                  <a:schemeClr val="accent1">
+                    <a:shade val="45000"/>
+                    <a:satMod val="135000"/>
+                  </a:schemeClr>
+                  <a:prstClr val="white"/>
+                </a:duotone>
+                <a:extLst>
+                  <a:ext uri="{BEBA8EAE-BF5A-486C-A8C5-ECC9F3942E4B}">
+                    <a14:imgProps xmlns:a14="http://schemas.microsoft.com/office/drawing/2010/main">
+                      <a14:imgLayer r:embed="rId3">
+                        <a14:imgEffect>
+                          <a14:saturation sat="95000"/>
+                        </a14:imgEffect>
+                        <a14:imgEffect>
+                          <a14:brightnessContrast bright="-40000" contrast="20000"/>
+                        </a14:imgEffect>
+                      </a14:imgLayer>
+                    </a14:imgProps>
+                  </a:ext>
+                </a:extLst>
+              </a:blip>
+              <a:srcRect/>
+              <a:tile tx="50800" ty="0" sx="85000" sy="85000" flip="none" algn="tl"/>
+            </a:blipFill>
+            <a:ln w="25400" cap="flat" cmpd="sng" algn="ctr">
+              <a:noFill/>
+              <a:prstDash val="solid"/>
+            </a:ln>
+            <a:effectLst/>
+          </p:spPr>
+        </p:sp>
+        <p:sp>
+          <p:nvSpPr>
+            <p:cNvPr id="23" name="Oval 22">
+              <a:extLst>
+                <a:ext uri="{FF2B5EF4-FFF2-40B4-BE49-F238E27FC236}">
+                  <a16:creationId xmlns:a16="http://schemas.microsoft.com/office/drawing/2014/main" id="{D6C61C9C-364D-4CB6-B9D1-1A6F50F6AF03}"/>
+                </a:ext>
+                <a:ext uri="{C183D7F6-B498-43B3-948B-1728B52AA6E4}">
+                  <adec:decorative xmlns:adec="http://schemas.microsoft.com/office/drawing/2017/decorative" val="1"/>
+                </a:ext>
+              </a:extLst>
+            </p:cNvPr>
+            <p:cNvSpPr/>
+            <p:nvPr>
+              <p:extLst>
+                <p:ext uri="{386F3935-93C4-4BCD-93E2-E3B085C9AB24}">
+                  <p16:designElem xmlns:p16="http://schemas.microsoft.com/office/powerpoint/2015/main" val="1"/>
+                </p:ext>
+              </p:extLst>
+            </p:nvPr>
+          </p:nvSpPr>
+          <p:spPr>
+            <a:xfrm>
+              <a:off x="11396488" y="6230844"/>
+              <a:ext cx="478576" cy="478578"/>
+            </a:xfrm>
+            <a:prstGeom prst="ellipse">
+              <a:avLst/>
+            </a:prstGeom>
+            <a:noFill/>
+            <a:ln w="12700" cap="flat" cmpd="sng" algn="ctr">
+              <a:solidFill>
+                <a:srgbClr val="FFFFFF"/>
+              </a:solidFill>
+              <a:prstDash val="solid"/>
+            </a:ln>
+            <a:effectLst/>
+          </p:spPr>
+        </p:sp>
+      </p:grpSp>
+      <p:pic>
+        <p:nvPicPr>
+          <p:cNvPr id="3" name="Picture 2" descr="A person riding a chair with a mop on his back&#10;&#10;Description automatically generated">
+            <a:extLst>
+              <a:ext uri="{FF2B5EF4-FFF2-40B4-BE49-F238E27FC236}">
+                <a16:creationId xmlns:a16="http://schemas.microsoft.com/office/drawing/2014/main" id="{7C3D488D-90EF-CFAC-593E-944DB2EFCF3C}"/>
+              </a:ext>
+            </a:extLst>
+          </p:cNvPr>
+          <p:cNvPicPr>
+            <a:picLocks noChangeAspect="1"/>
+          </p:cNvPicPr>
+          <p:nvPr/>
+        </p:nvPicPr>
+        <p:blipFill>
+          <a:blip r:embed="rId4"/>
+          <a:stretch>
+            <a:fillRect/>
+          </a:stretch>
+        </p:blipFill>
+        <p:spPr>
+          <a:xfrm>
+            <a:off x="1463935" y="289"/>
+            <a:ext cx="5820920" cy="6843791"/>
+          </a:xfrm>
+          <a:prstGeom prst="rect">
+            <a:avLst/>
+          </a:prstGeom>
+        </p:spPr>
+      </p:pic>
+      <p:sp>
+        <p:nvSpPr>
+          <p:cNvPr id="2" name="Slide Number Placeholder 1">
+            <a:extLst>
+              <a:ext uri="{FF2B5EF4-FFF2-40B4-BE49-F238E27FC236}">
+                <a16:creationId xmlns:a16="http://schemas.microsoft.com/office/drawing/2014/main" id="{C5AA8466-283D-0F31-1278-963E25DC0FB1}"/>
+              </a:ext>
+            </a:extLst>
+          </p:cNvPr>
+          <p:cNvSpPr>
+            <a:spLocks noGrp="1"/>
+          </p:cNvSpPr>
+          <p:nvPr>
+            <p:ph type="sldNum" sz="quarter" idx="12"/>
+          </p:nvPr>
+        </p:nvSpPr>
+        <p:spPr>
+          <a:xfrm>
+            <a:off x="8483346" y="6272784"/>
+            <a:ext cx="480060" cy="365125"/>
+          </a:xfrm>
+        </p:spPr>
+        <p:txBody>
+          <a:bodyPr vert="horz" lIns="91440" tIns="45720" rIns="91440" bIns="45720" rtlCol="0" anchor="ctr">
             <a:normAutofit/>
           </a:bodyPr>
           <a:lstStyle/>
           <a:p>
-            <a:r>
-              <a:rPr sz="3200" dirty="0"/>
-              <a:t>Requires less data.</a:t>
-            </a:r>
-          </a:p>
-          <a:p>
-            <a:r>
-              <a:rPr sz="3200" dirty="0"/>
-              <a:t>Reduces training time.</a:t>
-            </a:r>
-          </a:p>
-          <a:p>
-            <a:r>
-              <a:rPr sz="3200" dirty="0"/>
-              <a:t>Leverages knowledge from large, diverse datasets.</a:t>
-            </a:r>
-          </a:p>
-          <a:p>
-            <a:r>
-              <a:rPr sz="3200" dirty="0"/>
-              <a:t>Often leads to improved accuracy.</a:t>
-            </a:r>
-          </a:p>
-        </p:txBody>
-      </p:sp>
-      <p:sp>
-        <p:nvSpPr>
-          <p:cNvPr id="4" name="Slide Number Placeholder 3">
-            <a:extLst>
-              <a:ext uri="{FF2B5EF4-FFF2-40B4-BE49-F238E27FC236}">
-                <a16:creationId xmlns:a16="http://schemas.microsoft.com/office/drawing/2014/main" id="{2C2C39EB-17B5-562B-1966-C3F69F77896E}"/>
-              </a:ext>
-            </a:extLst>
-          </p:cNvPr>
-          <p:cNvSpPr>
-            <a:spLocks noGrp="1"/>
-          </p:cNvSpPr>
-          <p:nvPr>
-            <p:ph type="sldNum" sz="quarter" idx="12"/>
-          </p:nvPr>
-        </p:nvSpPr>
-        <p:spPr/>
-        <p:txBody>
-          <a:bodyPr/>
-          <a:lstStyle/>
-          <a:p>
+            <a:pPr>
+              <a:spcAft>
+                <a:spcPts val="600"/>
+              </a:spcAft>
+            </a:pPr>
             <a:fld id="{4FAB73BC-B049-4115-A692-8D63A059BFB8}" type="slidenum">
-              <a:rPr lang="en-US" smtClean="0"/>
-              <a:pPr/>
+              <a:rPr lang="en-US" sz="1400">
+                <a:latin typeface="+mj-lt"/>
+              </a:rPr>
+              <a:pPr>
+                <a:spcAft>
+                  <a:spcPts val="600"/>
+                </a:spcAft>
+              </a:pPr>
               <a:t>6</a:t>
             </a:fld>
-            <a:endParaRPr lang="en-US"/>
+            <a:endParaRPr lang="en-US" sz="1400">
+              <a:latin typeface="+mj-lt"/>
+            </a:endParaRPr>
           </a:p>
         </p:txBody>
       </p:sp>
     </p:spTree>
+    <p:extLst>
+      <p:ext uri="{BB962C8B-B14F-4D97-AF65-F5344CB8AC3E}">
+        <p14:creationId xmlns:p14="http://schemas.microsoft.com/office/powerpoint/2010/main" val="3758093755"/>
+      </p:ext>
+    </p:extLst>
   </p:cSld>
   <p:clrMapOvr>
     <a:masterClrMapping/>
@@ -5455,7 +7502,7 @@
           <a:lstStyle/>
           <a:p>
             <a:r>
-              <a:t>Challenges and Limitations</a:t>
+              <a:t>Examples in Practice</a:t>
             </a:r>
           </a:p>
         </p:txBody>
@@ -5478,28 +7525,40 @@
           <a:lstStyle/>
           <a:p>
             <a:r>
+              <a:rPr sz="3200" b="1" dirty="0"/>
+              <a:t>Computer Vision</a:t>
+            </a:r>
+            <a:r>
               <a:rPr sz="3200" dirty="0"/>
-              <a:t>Negative transfer: When the source and target tasks are too dissimilar.</a:t>
-            </a:r>
-          </a:p>
-          <a:p>
+              <a:t>: </a:t>
+            </a:r>
+            <a:r>
+              <a:rPr lang="en-GB" sz="3200" dirty="0"/>
+              <a:t>Pre-trained</a:t>
+            </a:r>
             <a:r>
               <a:rPr sz="3200" dirty="0"/>
-              <a:t>Computational cost of large </a:t>
-            </a:r>
-            <a:r>
-              <a:rPr lang="en-GB" sz="3200" dirty="0"/>
-              <a:t>pre-trained</a:t>
+              <a:t> CNNs for object detection.</a:t>
+            </a:r>
+          </a:p>
+          <a:p>
+            <a:r>
+              <a:rPr sz="3200" b="1" dirty="0"/>
+              <a:t>NLP</a:t>
             </a:r>
             <a:r>
               <a:rPr sz="3200" dirty="0"/>
-              <a:t> models.</a:t>
-            </a:r>
-          </a:p>
-          <a:p>
+              <a:t>: BERT, GPT for text classification and summarization.</a:t>
+            </a:r>
+          </a:p>
+          <a:p>
+            <a:r>
+              <a:rPr sz="3200" b="1" dirty="0"/>
+              <a:t>Healthcare</a:t>
+            </a:r>
             <a:r>
               <a:rPr sz="3200" dirty="0"/>
-              <a:t>Fine-tuning can still require significant resources.</a:t>
+              <a:t>: Transfer learning for rare disease diagnosis using limited datasets.</a:t>
             </a:r>
           </a:p>
         </p:txBody>
@@ -5509,7 +7568,7 @@
           <p:cNvPr id="4" name="Slide Number Placeholder 3">
             <a:extLst>
               <a:ext uri="{FF2B5EF4-FFF2-40B4-BE49-F238E27FC236}">
-                <a16:creationId xmlns:a16="http://schemas.microsoft.com/office/drawing/2014/main" id="{BE22E49D-0F32-DA93-2708-A8B33217FD90}"/>
+                <a16:creationId xmlns:a16="http://schemas.microsoft.com/office/drawing/2014/main" id="{839CF8C7-B6F1-BB99-D089-BAAA53AE6F54}"/>
               </a:ext>
             </a:extLst>
           </p:cNvPr>
@@ -5551,6 +7610,222 @@
       </p:transition>
     </mc:Fallback>
   </mc:AlternateContent>
+  <p:timing>
+    <p:tnLst>
+      <p:par>
+        <p:cTn id="1" dur="indefinite" restart="never" nodeType="tmRoot">
+          <p:childTnLst>
+            <p:seq concurrent="1" nextAc="seek">
+              <p:cTn id="2" dur="indefinite" nodeType="mainSeq">
+                <p:childTnLst>
+                  <p:par>
+                    <p:cTn id="3" fill="hold">
+                      <p:stCondLst>
+                        <p:cond delay="indefinite"/>
+                      </p:stCondLst>
+                      <p:childTnLst>
+                        <p:par>
+                          <p:cTn id="4" fill="hold">
+                            <p:stCondLst>
+                              <p:cond delay="0"/>
+                            </p:stCondLst>
+                            <p:childTnLst>
+                              <p:par>
+                                <p:cTn id="5" presetID="10" presetClass="entr" presetSubtype="0" fill="hold" grpId="0" nodeType="clickEffect">
+                                  <p:stCondLst>
+                                    <p:cond delay="0"/>
+                                  </p:stCondLst>
+                                  <p:childTnLst>
+                                    <p:set>
+                                      <p:cBhvr>
+                                        <p:cTn id="6" dur="1" fill="hold">
+                                          <p:stCondLst>
+                                            <p:cond delay="0"/>
+                                          </p:stCondLst>
+                                        </p:cTn>
+                                        <p:tgtEl>
+                                          <p:spTgt spid="3">
+                                            <p:txEl>
+                                              <p:pRg st="0" end="0"/>
+                                            </p:txEl>
+                                          </p:spTgt>
+                                        </p:tgtEl>
+                                        <p:attrNameLst>
+                                          <p:attrName>style.visibility</p:attrName>
+                                        </p:attrNameLst>
+                                      </p:cBhvr>
+                                      <p:to>
+                                        <p:strVal val="visible"/>
+                                      </p:to>
+                                    </p:set>
+                                    <p:animEffect transition="in" filter="fade">
+                                      <p:cBhvr>
+                                        <p:cTn id="7" dur="500"/>
+                                        <p:tgtEl>
+                                          <p:spTgt spid="3">
+                                            <p:txEl>
+                                              <p:pRg st="0" end="0"/>
+                                            </p:txEl>
+                                          </p:spTgt>
+                                        </p:tgtEl>
+                                      </p:cBhvr>
+                                    </p:animEffect>
+                                  </p:childTnLst>
+                                </p:cTn>
+                              </p:par>
+                            </p:childTnLst>
+                          </p:cTn>
+                        </p:par>
+                      </p:childTnLst>
+                    </p:cTn>
+                  </p:par>
+                  <p:par>
+                    <p:cTn id="8" fill="hold">
+                      <p:stCondLst>
+                        <p:cond delay="indefinite"/>
+                      </p:stCondLst>
+                      <p:childTnLst>
+                        <p:par>
+                          <p:cTn id="9" fill="hold">
+                            <p:stCondLst>
+                              <p:cond delay="0"/>
+                            </p:stCondLst>
+                            <p:childTnLst>
+                              <p:par>
+                                <p:cTn id="10" presetID="10" presetClass="entr" presetSubtype="0" fill="hold" grpId="0" nodeType="clickEffect">
+                                  <p:stCondLst>
+                                    <p:cond delay="0"/>
+                                  </p:stCondLst>
+                                  <p:childTnLst>
+                                    <p:set>
+                                      <p:cBhvr>
+                                        <p:cTn id="11" dur="1" fill="hold">
+                                          <p:stCondLst>
+                                            <p:cond delay="0"/>
+                                          </p:stCondLst>
+                                        </p:cTn>
+                                        <p:tgtEl>
+                                          <p:spTgt spid="3">
+                                            <p:txEl>
+                                              <p:pRg st="1" end="1"/>
+                                            </p:txEl>
+                                          </p:spTgt>
+                                        </p:tgtEl>
+                                        <p:attrNameLst>
+                                          <p:attrName>style.visibility</p:attrName>
+                                        </p:attrNameLst>
+                                      </p:cBhvr>
+                                      <p:to>
+                                        <p:strVal val="visible"/>
+                                      </p:to>
+                                    </p:set>
+                                    <p:animEffect transition="in" filter="fade">
+                                      <p:cBhvr>
+                                        <p:cTn id="12" dur="500"/>
+                                        <p:tgtEl>
+                                          <p:spTgt spid="3">
+                                            <p:txEl>
+                                              <p:pRg st="1" end="1"/>
+                                            </p:txEl>
+                                          </p:spTgt>
+                                        </p:tgtEl>
+                                      </p:cBhvr>
+                                    </p:animEffect>
+                                  </p:childTnLst>
+                                </p:cTn>
+                              </p:par>
+                            </p:childTnLst>
+                          </p:cTn>
+                        </p:par>
+                      </p:childTnLst>
+                    </p:cTn>
+                  </p:par>
+                  <p:par>
+                    <p:cTn id="13" fill="hold">
+                      <p:stCondLst>
+                        <p:cond delay="indefinite"/>
+                      </p:stCondLst>
+                      <p:childTnLst>
+                        <p:par>
+                          <p:cTn id="14" fill="hold">
+                            <p:stCondLst>
+                              <p:cond delay="0"/>
+                            </p:stCondLst>
+                            <p:childTnLst>
+                              <p:par>
+                                <p:cTn id="15" presetID="10" presetClass="entr" presetSubtype="0" fill="hold" grpId="0" nodeType="clickEffect">
+                                  <p:stCondLst>
+                                    <p:cond delay="0"/>
+                                  </p:stCondLst>
+                                  <p:childTnLst>
+                                    <p:set>
+                                      <p:cBhvr>
+                                        <p:cTn id="16" dur="1" fill="hold">
+                                          <p:stCondLst>
+                                            <p:cond delay="0"/>
+                                          </p:stCondLst>
+                                        </p:cTn>
+                                        <p:tgtEl>
+                                          <p:spTgt spid="3">
+                                            <p:txEl>
+                                              <p:pRg st="2" end="2"/>
+                                            </p:txEl>
+                                          </p:spTgt>
+                                        </p:tgtEl>
+                                        <p:attrNameLst>
+                                          <p:attrName>style.visibility</p:attrName>
+                                        </p:attrNameLst>
+                                      </p:cBhvr>
+                                      <p:to>
+                                        <p:strVal val="visible"/>
+                                      </p:to>
+                                    </p:set>
+                                    <p:animEffect transition="in" filter="fade">
+                                      <p:cBhvr>
+                                        <p:cTn id="17" dur="500"/>
+                                        <p:tgtEl>
+                                          <p:spTgt spid="3">
+                                            <p:txEl>
+                                              <p:pRg st="2" end="2"/>
+                                            </p:txEl>
+                                          </p:spTgt>
+                                        </p:tgtEl>
+                                      </p:cBhvr>
+                                    </p:animEffect>
+                                  </p:childTnLst>
+                                </p:cTn>
+                              </p:par>
+                            </p:childTnLst>
+                          </p:cTn>
+                        </p:par>
+                      </p:childTnLst>
+                    </p:cTn>
+                  </p:par>
+                </p:childTnLst>
+              </p:cTn>
+              <p:prevCondLst>
+                <p:cond evt="onPrev" delay="0">
+                  <p:tgtEl>
+                    <p:sldTgt/>
+                  </p:tgtEl>
+                </p:cond>
+              </p:prevCondLst>
+              <p:nextCondLst>
+                <p:cond evt="onNext" delay="0">
+                  <p:tgtEl>
+                    <p:sldTgt/>
+                  </p:tgtEl>
+                </p:cond>
+              </p:nextCondLst>
+            </p:seq>
+          </p:childTnLst>
+        </p:cTn>
+      </p:par>
+    </p:tnLst>
+    <p:bldLst>
+      <p:bldP spid="3" grpId="0" build="p"/>
+    </p:bldLst>
+  </p:timing>
 </p:sld>
 </file>
 
@@ -5587,10 +7862,8 @@
           <a:lstStyle/>
           <a:p>
             <a:r>
-              <a:rPr lang="en-GB" dirty="0"/>
-              <a:t>Code example</a:t>
-            </a:r>
-            <a:endParaRPr dirty="0"/>
+              <a:t>Advantages of Transfer Learning</a:t>
+            </a:r>
           </a:p>
         </p:txBody>
       </p:sp>
@@ -5612,12 +7885,27 @@
           <a:lstStyle/>
           <a:p>
             <a:r>
-              <a:rPr lang="en-GB" sz="3200" dirty="0">
-                <a:hlinkClick r:id="rId2"/>
-              </a:rPr>
-              <a:t>Code Example</a:t>
-            </a:r>
-            <a:endParaRPr sz="3200" dirty="0"/>
+              <a:rPr sz="3200" dirty="0"/>
+              <a:t>Requires less data.</a:t>
+            </a:r>
+          </a:p>
+          <a:p>
+            <a:r>
+              <a:rPr sz="3200" dirty="0"/>
+              <a:t>Reduces training time.</a:t>
+            </a:r>
+          </a:p>
+          <a:p>
+            <a:r>
+              <a:rPr sz="3200" dirty="0"/>
+              <a:t>Leverages knowledge from large, diverse datasets.</a:t>
+            </a:r>
+          </a:p>
+          <a:p>
+            <a:r>
+              <a:rPr sz="3200" dirty="0"/>
+              <a:t>Often leads to improved accuracy.</a:t>
+            </a:r>
           </a:p>
         </p:txBody>
       </p:sp>
@@ -5626,7 +7914,7 @@
           <p:cNvPr id="4" name="Slide Number Placeholder 3">
             <a:extLst>
               <a:ext uri="{FF2B5EF4-FFF2-40B4-BE49-F238E27FC236}">
-                <a16:creationId xmlns:a16="http://schemas.microsoft.com/office/drawing/2014/main" id="{EE44322F-30C9-AB52-54E8-1E0E2FC8A54F}"/>
+                <a16:creationId xmlns:a16="http://schemas.microsoft.com/office/drawing/2014/main" id="{2C2C39EB-17B5-562B-1966-C3F69F77896E}"/>
               </a:ext>
             </a:extLst>
           </p:cNvPr>
@@ -5668,6 +7956,283 @@
       </p:transition>
     </mc:Fallback>
   </mc:AlternateContent>
+  <p:timing>
+    <p:tnLst>
+      <p:par>
+        <p:cTn id="1" dur="indefinite" restart="never" nodeType="tmRoot">
+          <p:childTnLst>
+            <p:seq concurrent="1" nextAc="seek">
+              <p:cTn id="2" dur="indefinite" nodeType="mainSeq">
+                <p:childTnLst>
+                  <p:par>
+                    <p:cTn id="3" fill="hold">
+                      <p:stCondLst>
+                        <p:cond delay="indefinite"/>
+                      </p:stCondLst>
+                      <p:childTnLst>
+                        <p:par>
+                          <p:cTn id="4" fill="hold">
+                            <p:stCondLst>
+                              <p:cond delay="0"/>
+                            </p:stCondLst>
+                            <p:childTnLst>
+                              <p:par>
+                                <p:cTn id="5" presetID="10" presetClass="entr" presetSubtype="0" fill="hold" grpId="0" nodeType="clickEffect">
+                                  <p:stCondLst>
+                                    <p:cond delay="0"/>
+                                  </p:stCondLst>
+                                  <p:childTnLst>
+                                    <p:set>
+                                      <p:cBhvr>
+                                        <p:cTn id="6" dur="1" fill="hold">
+                                          <p:stCondLst>
+                                            <p:cond delay="0"/>
+                                          </p:stCondLst>
+                                        </p:cTn>
+                                        <p:tgtEl>
+                                          <p:spTgt spid="3">
+                                            <p:txEl>
+                                              <p:pRg st="0" end="0"/>
+                                            </p:txEl>
+                                          </p:spTgt>
+                                        </p:tgtEl>
+                                        <p:attrNameLst>
+                                          <p:attrName>style.visibility</p:attrName>
+                                        </p:attrNameLst>
+                                      </p:cBhvr>
+                                      <p:to>
+                                        <p:strVal val="visible"/>
+                                      </p:to>
+                                    </p:set>
+                                    <p:animEffect transition="in" filter="fade">
+                                      <p:cBhvr>
+                                        <p:cTn id="7" dur="500"/>
+                                        <p:tgtEl>
+                                          <p:spTgt spid="3">
+                                            <p:txEl>
+                                              <p:pRg st="0" end="0"/>
+                                            </p:txEl>
+                                          </p:spTgt>
+                                        </p:tgtEl>
+                                      </p:cBhvr>
+                                    </p:animEffect>
+                                  </p:childTnLst>
+                                </p:cTn>
+                              </p:par>
+                            </p:childTnLst>
+                          </p:cTn>
+                        </p:par>
+                      </p:childTnLst>
+                    </p:cTn>
+                  </p:par>
+                  <p:par>
+                    <p:cTn id="8" fill="hold">
+                      <p:stCondLst>
+                        <p:cond delay="indefinite"/>
+                      </p:stCondLst>
+                      <p:childTnLst>
+                        <p:par>
+                          <p:cTn id="9" fill="hold">
+                            <p:stCondLst>
+                              <p:cond delay="0"/>
+                            </p:stCondLst>
+                            <p:childTnLst>
+                              <p:par>
+                                <p:cTn id="10" presetID="10" presetClass="entr" presetSubtype="0" fill="hold" grpId="0" nodeType="clickEffect">
+                                  <p:stCondLst>
+                                    <p:cond delay="0"/>
+                                  </p:stCondLst>
+                                  <p:childTnLst>
+                                    <p:set>
+                                      <p:cBhvr>
+                                        <p:cTn id="11" dur="1" fill="hold">
+                                          <p:stCondLst>
+                                            <p:cond delay="0"/>
+                                          </p:stCondLst>
+                                        </p:cTn>
+                                        <p:tgtEl>
+                                          <p:spTgt spid="3">
+                                            <p:txEl>
+                                              <p:pRg st="1" end="1"/>
+                                            </p:txEl>
+                                          </p:spTgt>
+                                        </p:tgtEl>
+                                        <p:attrNameLst>
+                                          <p:attrName>style.visibility</p:attrName>
+                                        </p:attrNameLst>
+                                      </p:cBhvr>
+                                      <p:to>
+                                        <p:strVal val="visible"/>
+                                      </p:to>
+                                    </p:set>
+                                    <p:animEffect transition="in" filter="fade">
+                                      <p:cBhvr>
+                                        <p:cTn id="12" dur="500"/>
+                                        <p:tgtEl>
+                                          <p:spTgt spid="3">
+                                            <p:txEl>
+                                              <p:pRg st="1" end="1"/>
+                                            </p:txEl>
+                                          </p:spTgt>
+                                        </p:tgtEl>
+                                      </p:cBhvr>
+                                    </p:animEffect>
+                                  </p:childTnLst>
+                                </p:cTn>
+                              </p:par>
+                            </p:childTnLst>
+                          </p:cTn>
+                        </p:par>
+                      </p:childTnLst>
+                    </p:cTn>
+                  </p:par>
+                  <p:par>
+                    <p:cTn id="13" fill="hold">
+                      <p:stCondLst>
+                        <p:cond delay="indefinite"/>
+                      </p:stCondLst>
+                      <p:childTnLst>
+                        <p:par>
+                          <p:cTn id="14" fill="hold">
+                            <p:stCondLst>
+                              <p:cond delay="0"/>
+                            </p:stCondLst>
+                            <p:childTnLst>
+                              <p:par>
+                                <p:cTn id="15" presetID="10" presetClass="entr" presetSubtype="0" fill="hold" grpId="0" nodeType="clickEffect">
+                                  <p:stCondLst>
+                                    <p:cond delay="0"/>
+                                  </p:stCondLst>
+                                  <p:childTnLst>
+                                    <p:set>
+                                      <p:cBhvr>
+                                        <p:cTn id="16" dur="1" fill="hold">
+                                          <p:stCondLst>
+                                            <p:cond delay="0"/>
+                                          </p:stCondLst>
+                                        </p:cTn>
+                                        <p:tgtEl>
+                                          <p:spTgt spid="3">
+                                            <p:txEl>
+                                              <p:pRg st="2" end="2"/>
+                                            </p:txEl>
+                                          </p:spTgt>
+                                        </p:tgtEl>
+                                        <p:attrNameLst>
+                                          <p:attrName>style.visibility</p:attrName>
+                                        </p:attrNameLst>
+                                      </p:cBhvr>
+                                      <p:to>
+                                        <p:strVal val="visible"/>
+                                      </p:to>
+                                    </p:set>
+                                    <p:animEffect transition="in" filter="fade">
+                                      <p:cBhvr>
+                                        <p:cTn id="17" dur="500"/>
+                                        <p:tgtEl>
+                                          <p:spTgt spid="3">
+                                            <p:txEl>
+                                              <p:pRg st="2" end="2"/>
+                                            </p:txEl>
+                                          </p:spTgt>
+                                        </p:tgtEl>
+                                      </p:cBhvr>
+                                    </p:animEffect>
+                                  </p:childTnLst>
+                                </p:cTn>
+                              </p:par>
+                            </p:childTnLst>
+                          </p:cTn>
+                        </p:par>
+                      </p:childTnLst>
+                    </p:cTn>
+                  </p:par>
+                  <p:par>
+                    <p:cTn id="18" fill="hold">
+                      <p:stCondLst>
+                        <p:cond delay="indefinite"/>
+                      </p:stCondLst>
+                      <p:childTnLst>
+                        <p:par>
+                          <p:cTn id="19" fill="hold">
+                            <p:stCondLst>
+                              <p:cond delay="0"/>
+                            </p:stCondLst>
+                            <p:childTnLst>
+                              <p:par>
+                                <p:cTn id="20" presetID="10" presetClass="entr" presetSubtype="0" fill="hold" grpId="0" nodeType="clickEffect">
+                                  <p:stCondLst>
+                                    <p:cond delay="0"/>
+                                  </p:stCondLst>
+                                  <p:childTnLst>
+                                    <p:set>
+                                      <p:cBhvr>
+                                        <p:cTn id="21" dur="1" fill="hold">
+                                          <p:stCondLst>
+                                            <p:cond delay="0"/>
+                                          </p:stCondLst>
+                                        </p:cTn>
+                                        <p:tgtEl>
+                                          <p:spTgt spid="3">
+                                            <p:txEl>
+                                              <p:pRg st="3" end="3"/>
+                                            </p:txEl>
+                                          </p:spTgt>
+                                        </p:tgtEl>
+                                        <p:attrNameLst>
+                                          <p:attrName>style.visibility</p:attrName>
+                                        </p:attrNameLst>
+                                      </p:cBhvr>
+                                      <p:to>
+                                        <p:strVal val="visible"/>
+                                      </p:to>
+                                    </p:set>
+                                    <p:animEffect transition="in" filter="fade">
+                                      <p:cBhvr>
+                                        <p:cTn id="22" dur="500"/>
+                                        <p:tgtEl>
+                                          <p:spTgt spid="3">
+                                            <p:txEl>
+                                              <p:pRg st="3" end="3"/>
+                                            </p:txEl>
+                                          </p:spTgt>
+                                        </p:tgtEl>
+                                      </p:cBhvr>
+                                    </p:animEffect>
+                                  </p:childTnLst>
+                                </p:cTn>
+                              </p:par>
+                            </p:childTnLst>
+                          </p:cTn>
+                        </p:par>
+                      </p:childTnLst>
+                    </p:cTn>
+                  </p:par>
+                </p:childTnLst>
+              </p:cTn>
+              <p:prevCondLst>
+                <p:cond evt="onPrev" delay="0">
+                  <p:tgtEl>
+                    <p:sldTgt/>
+                  </p:tgtEl>
+                </p:cond>
+              </p:prevCondLst>
+              <p:nextCondLst>
+                <p:cond evt="onNext" delay="0">
+                  <p:tgtEl>
+                    <p:sldTgt/>
+                  </p:tgtEl>
+                </p:cond>
+              </p:nextCondLst>
+            </p:seq>
+          </p:childTnLst>
+        </p:cTn>
+      </p:par>
+    </p:tnLst>
+    <p:bldLst>
+      <p:bldP spid="3" grpId="0" build="p"/>
+    </p:bldLst>
+  </p:timing>
 </p:sld>
 </file>
 
@@ -5690,65 +8255,10 @@
       </p:grpSpPr>
       <p:sp>
         <p:nvSpPr>
-          <p:cNvPr id="2" name="Title 1"/>
-          <p:cNvSpPr>
-            <a:spLocks noGrp="1"/>
-          </p:cNvSpPr>
-          <p:nvPr>
-            <p:ph type="title"/>
-          </p:nvPr>
-        </p:nvSpPr>
-        <p:spPr/>
-        <p:txBody>
-          <a:bodyPr/>
-          <a:lstStyle/>
-          <a:p>
-            <a:r>
-              <a:t>Summary and Q&amp;A</a:t>
-            </a:r>
-          </a:p>
-        </p:txBody>
-      </p:sp>
-      <p:sp>
-        <p:nvSpPr>
-          <p:cNvPr id="3" name="Content Placeholder 2"/>
-          <p:cNvSpPr>
-            <a:spLocks noGrp="1"/>
-          </p:cNvSpPr>
-          <p:nvPr>
-            <p:ph idx="1"/>
-          </p:nvPr>
-        </p:nvSpPr>
-        <p:spPr/>
-        <p:txBody>
-          <a:bodyPr>
-            <a:normAutofit/>
-          </a:bodyPr>
-          <a:lstStyle/>
-          <a:p>
-            <a:r>
-              <a:rPr sz="3200" dirty="0"/>
-              <a:t>Transfer learning enables efficient and effective machine learning by leveraging existing knowledge.</a:t>
-            </a:r>
-          </a:p>
-          <a:p>
-            <a:r>
-              <a:rPr sz="3200"/>
-              <a:t>Thank </a:t>
-            </a:r>
-            <a:r>
-              <a:rPr sz="3200" dirty="0"/>
-              <a:t>you for your attention! Any questions?</a:t>
-            </a:r>
-          </a:p>
-        </p:txBody>
-      </p:sp>
-      <p:sp>
-        <p:nvSpPr>
           <p:cNvPr id="4" name="Slide Number Placeholder 3">
             <a:extLst>
               <a:ext uri="{FF2B5EF4-FFF2-40B4-BE49-F238E27FC236}">
-                <a16:creationId xmlns:a16="http://schemas.microsoft.com/office/drawing/2014/main" id="{0F48783E-E8FD-F30F-F322-0204CD1E4619}"/>
+                <a16:creationId xmlns:a16="http://schemas.microsoft.com/office/drawing/2014/main" id="{BE22E49D-0F32-DA93-2708-A8B33217FD90}"/>
               </a:ext>
             </a:extLst>
           </p:cNvPr>
@@ -5773,6 +8283,116 @@
           </a:p>
         </p:txBody>
       </p:sp>
+      <p:grpSp>
+        <p:nvGrpSpPr>
+          <p:cNvPr id="7" name="Group 6">
+            <a:extLst>
+              <a:ext uri="{FF2B5EF4-FFF2-40B4-BE49-F238E27FC236}">
+                <a16:creationId xmlns:a16="http://schemas.microsoft.com/office/drawing/2014/main" id="{650D796F-553F-0710-732F-4F83A27A1C91}"/>
+              </a:ext>
+            </a:extLst>
+          </p:cNvPr>
+          <p:cNvGrpSpPr/>
+          <p:nvPr/>
+        </p:nvGrpSpPr>
+        <p:grpSpPr>
+          <a:xfrm>
+            <a:off x="287274" y="-1581"/>
+            <a:ext cx="8583104" cy="6639387"/>
+            <a:chOff x="563045" y="20190"/>
+            <a:chExt cx="7763049" cy="6610360"/>
+          </a:xfrm>
+        </p:grpSpPr>
+        <p:pic>
+          <p:nvPicPr>
+            <p:cNvPr id="5" name="Picture 4" descr="A group of cartoon robots with words&#10;&#10;Description automatically generated">
+              <a:extLst>
+                <a:ext uri="{FF2B5EF4-FFF2-40B4-BE49-F238E27FC236}">
+                  <a16:creationId xmlns:a16="http://schemas.microsoft.com/office/drawing/2014/main" id="{CB7EFC87-714B-E3FE-CD00-937D58E2EB8E}"/>
+                </a:ext>
+              </a:extLst>
+            </p:cNvPr>
+            <p:cNvPicPr>
+              <a:picLocks noChangeAspect="1"/>
+            </p:cNvPicPr>
+            <p:nvPr/>
+          </p:nvPicPr>
+          <p:blipFill>
+            <a:blip r:embed="rId2"/>
+            <a:stretch>
+              <a:fillRect/>
+            </a:stretch>
+          </p:blipFill>
+          <p:spPr>
+            <a:xfrm>
+              <a:off x="563045" y="20190"/>
+              <a:ext cx="7763049" cy="6610360"/>
+            </a:xfrm>
+            <a:prstGeom prst="rect">
+              <a:avLst/>
+            </a:prstGeom>
+          </p:spPr>
+        </p:pic>
+        <p:sp>
+          <p:nvSpPr>
+            <p:cNvPr id="6" name="TextBox 5">
+              <a:extLst>
+                <a:ext uri="{FF2B5EF4-FFF2-40B4-BE49-F238E27FC236}">
+                  <a16:creationId xmlns:a16="http://schemas.microsoft.com/office/drawing/2014/main" id="{73947F1C-7830-95DA-4D12-6D544CEBB186}"/>
+                </a:ext>
+              </a:extLst>
+            </p:cNvPr>
+            <p:cNvSpPr txBox="1"/>
+            <p:nvPr/>
+          </p:nvSpPr>
+          <p:spPr>
+            <a:xfrm>
+              <a:off x="4252685" y="6197600"/>
+              <a:ext cx="3962400" cy="261610"/>
+            </a:xfrm>
+            <a:prstGeom prst="rect">
+              <a:avLst/>
+            </a:prstGeom>
+            <a:noFill/>
+          </p:spPr>
+          <p:txBody>
+            <a:bodyPr rot="0" spcFirstLastPara="0" vertOverflow="overflow" horzOverflow="overflow" vert="horz" wrap="square" lIns="91440" tIns="45720" rIns="91440" bIns="45720" numCol="1" spcCol="0" rtlCol="0" fromWordArt="0" anchor="t" anchorCtr="0" forceAA="0" compatLnSpc="1">
+              <a:prstTxWarp prst="textNoShape">
+                <a:avLst/>
+              </a:prstTxWarp>
+              <a:spAutoFit/>
+            </a:bodyPr>
+            <a:lstStyle/>
+            <a:p>
+              <a:r>
+                <a:rPr lang="en-US" sz="1100" dirty="0">
+                  <a:solidFill>
+                    <a:srgbClr val="6B6B6B"/>
+                  </a:solidFill>
+                  <a:ea typeface="+mn-lt"/>
+                  <a:cs typeface="+mn-lt"/>
+                </a:rPr>
+                <a:t>Image source: </a:t>
+              </a:r>
+              <a:r>
+                <a:rPr lang="en-US" sz="1100" u="sng" dirty="0">
+                  <a:solidFill>
+                    <a:srgbClr val="6B6B6B"/>
+                  </a:solidFill>
+                  <a:ea typeface="+mn-lt"/>
+                  <a:cs typeface="+mn-lt"/>
+                  <a:hlinkClick r:id="rId3"/>
+                </a:rPr>
+                <a:t>https://tinyurl.com/4nenf9c9</a:t>
+              </a:r>
+              <a:endParaRPr lang="en-US" sz="1100" u="sng" dirty="0">
+                <a:ea typeface="+mn-lt"/>
+                <a:cs typeface="+mn-lt"/>
+              </a:endParaRPr>
+            </a:p>
+          </p:txBody>
+        </p:sp>
+      </p:grpSp>
     </p:spTree>
   </p:cSld>
   <p:clrMapOvr>
@@ -5790,6 +8410,89 @@
       </p:transition>
     </mc:Fallback>
   </mc:AlternateContent>
+  <p:timing>
+    <p:tnLst>
+      <p:par>
+        <p:cTn id="1" dur="indefinite" restart="never" nodeType="tmRoot">
+          <p:childTnLst>
+            <p:seq concurrent="1" nextAc="seek">
+              <p:cTn id="2" dur="indefinite" nodeType="mainSeq">
+                <p:childTnLst>
+                  <p:par>
+                    <p:cTn id="3" fill="hold">
+                      <p:stCondLst>
+                        <p:cond delay="indefinite"/>
+                      </p:stCondLst>
+                      <p:childTnLst>
+                        <p:par>
+                          <p:cTn id="4" fill="hold">
+                            <p:stCondLst>
+                              <p:cond delay="0"/>
+                            </p:stCondLst>
+                            <p:childTnLst>
+                              <p:par>
+                                <p:cTn id="5" presetID="16" presetClass="exit" presetSubtype="21" fill="hold" nodeType="clickEffect">
+                                  <p:stCondLst>
+                                    <p:cond delay="0"/>
+                                  </p:stCondLst>
+                                  <p:childTnLst>
+                                    <p:animEffect transition="out" filter="barn(inVertical)">
+                                      <p:cBhvr>
+                                        <p:cTn id="6" dur="1000"/>
+                                        <p:tgtEl>
+                                          <p:spTgt spid="7"/>
+                                        </p:tgtEl>
+                                      </p:cBhvr>
+                                    </p:animEffect>
+                                    <p:set>
+                                      <p:cBhvr>
+                                        <p:cTn id="7" dur="1" fill="hold">
+                                          <p:stCondLst>
+                                            <p:cond delay="999"/>
+                                          </p:stCondLst>
+                                        </p:cTn>
+                                        <p:tgtEl>
+                                          <p:spTgt spid="7"/>
+                                        </p:tgtEl>
+                                        <p:attrNameLst>
+                                          <p:attrName>style.visibility</p:attrName>
+                                        </p:attrNameLst>
+                                      </p:cBhvr>
+                                      <p:to>
+                                        <p:strVal val="hidden"/>
+                                      </p:to>
+                                    </p:set>
+                                  </p:childTnLst>
+                                </p:cTn>
+                              </p:par>
+                            </p:childTnLst>
+                          </p:cTn>
+                        </p:par>
+                      </p:childTnLst>
+                    </p:cTn>
+                  </p:par>
+                </p:childTnLst>
+              </p:cTn>
+              <p:prevCondLst>
+                <p:cond evt="onPrev" delay="0">
+                  <p:tgtEl>
+                    <p:sldTgt/>
+                  </p:tgtEl>
+                </p:cond>
+              </p:prevCondLst>
+              <p:nextCondLst>
+                <p:cond evt="onNext" delay="0">
+                  <p:tgtEl>
+                    <p:sldTgt/>
+                  </p:tgtEl>
+                </p:cond>
+              </p:nextCondLst>
+            </p:seq>
+          </p:childTnLst>
+        </p:cTn>
+      </p:par>
+    </p:tnLst>
+  </p:timing>
 </p:sld>
 </file>
 

</xml_diff>

<commit_message>
Updated Slides and added image
</commit_message>
<xml_diff>
--- a/slides/Transfer_Learning_Presentation.pptx
+++ b/slides/Transfer_Learning_Presentation.pptx
@@ -18,7 +18,8 @@
     <p:sldId id="262" r:id="rId12"/>
     <p:sldId id="263" r:id="rId13"/>
     <p:sldId id="269" r:id="rId14"/>
-    <p:sldId id="267" r:id="rId15"/>
+    <p:sldId id="270" r:id="rId15"/>
+    <p:sldId id="267" r:id="rId16"/>
   </p:sldIdLst>
   <p:sldSz cx="9144000" cy="6858000" type="screen4x3"/>
   <p:notesSz cx="6858000" cy="9144000"/>
@@ -140,7 +141,7 @@
 <p1510:revInfo xmlns:a="http://schemas.openxmlformats.org/drawingml/2006/main" xmlns:r="http://schemas.openxmlformats.org/officeDocument/2006/relationships" xmlns:p1510="http://schemas.microsoft.com/office/powerpoint/2015/10/main">
   <p1510:revLst>
     <p1510:client id="{A9F5F520-59B3-1B4F-4975-D5598A20FFFD}" v="246" dt="2024-12-25T21:48:18.192"/>
-    <p1510:client id="{C03BEFDD-5E21-5A87-1107-243E583CCB18}" v="53" dt="2024-12-25T21:55:30.002"/>
+    <p1510:client id="{C03BEFDD-5E21-5A87-1107-243E583CCB18}" v="59" dt="2024-12-25T22:10:04.003"/>
   </p1510:revLst>
 </p1510:revInfo>
 </file>
@@ -5557,6 +5558,14 @@
 <file path=ppt/slides/slide13.xml><?xml version="1.0" encoding="utf-8"?>
 <p:sld xmlns:a="http://schemas.openxmlformats.org/drawingml/2006/main" xmlns:r="http://schemas.openxmlformats.org/officeDocument/2006/relationships" xmlns:p="http://schemas.openxmlformats.org/presentationml/2006/main">
   <p:cSld>
+    <p:bg>
+      <p:bgPr>
+        <a:solidFill>
+          <a:schemeClr val="bg1"/>
+        </a:solidFill>
+        <a:effectLst/>
+      </p:bgPr>
+    </p:bg>
     <p:spTree>
       <p:nvGrpSpPr>
         <p:cNvPr id="1" name=""/>
@@ -5571,6 +5580,366 @@
           <a:chExt cx="0" cy="0"/>
         </a:xfrm>
       </p:grpSpPr>
+      <p:grpSp>
+        <p:nvGrpSpPr>
+          <p:cNvPr id="23" name="Group 22">
+            <a:extLst>
+              <a:ext uri="{FF2B5EF4-FFF2-40B4-BE49-F238E27FC236}">
+                <a16:creationId xmlns:a16="http://schemas.microsoft.com/office/drawing/2014/main" id="{2A313B03-D361-4EC9-AF52-0B3C1C92C26D}"/>
+              </a:ext>
+              <a:ext uri="{C183D7F6-B498-43B3-948B-1728B52AA6E4}">
+                <adec:decorative xmlns:adec="http://schemas.microsoft.com/office/drawing/2017/decorative" val="1"/>
+              </a:ext>
+            </a:extLst>
+          </p:cNvPr>
+          <p:cNvGrpSpPr>
+            <a:grpSpLocks noGrp="1" noUngrp="1" noRot="1" noChangeAspect="1" noMove="1" noResize="1"/>
+          </p:cNvGrpSpPr>
+          <p:nvPr>
+            <p:extLst>
+              <p:ext uri="{386F3935-93C4-4BCD-93E2-E3B085C9AB24}">
+                <p16:designElem xmlns:p16="http://schemas.microsoft.com/office/powerpoint/2015/main" val="1"/>
+              </p:ext>
+            </p:extLst>
+          </p:nvPr>
+        </p:nvGrpSpPr>
+        <p:grpSpPr>
+          <a:xfrm>
+            <a:off x="8551293" y="6229681"/>
+            <a:ext cx="342900" cy="457200"/>
+            <a:chOff x="11361456" y="6195813"/>
+            <a:chExt cx="548640" cy="548640"/>
+          </a:xfrm>
+        </p:grpSpPr>
+        <p:sp>
+          <p:nvSpPr>
+            <p:cNvPr id="15" name="Oval 14">
+              <a:extLst>
+                <a:ext uri="{FF2B5EF4-FFF2-40B4-BE49-F238E27FC236}">
+                  <a16:creationId xmlns:a16="http://schemas.microsoft.com/office/drawing/2014/main" id="{5E79CB85-A08A-4579-86F6-A8AA97551B88}"/>
+                </a:ext>
+                <a:ext uri="{C183D7F6-B498-43B3-948B-1728B52AA6E4}">
+                  <adec:decorative xmlns:adec="http://schemas.microsoft.com/office/drawing/2017/decorative" val="1"/>
+                </a:ext>
+              </a:extLst>
+            </p:cNvPr>
+            <p:cNvSpPr/>
+            <p:nvPr>
+              <p:extLst>
+                <p:ext uri="{386F3935-93C4-4BCD-93E2-E3B085C9AB24}">
+                  <p16:designElem xmlns:p16="http://schemas.microsoft.com/office/powerpoint/2015/main" val="1"/>
+                </p:ext>
+              </p:extLst>
+            </p:nvPr>
+          </p:nvSpPr>
+          <p:spPr>
+            <a:xfrm>
+              <a:off x="11361456" y="6195813"/>
+              <a:ext cx="548640" cy="548640"/>
+            </a:xfrm>
+            <a:prstGeom prst="ellipse">
+              <a:avLst/>
+            </a:prstGeom>
+            <a:blipFill dpi="0" rotWithShape="1">
+              <a:blip r:embed="rId2">
+                <a:duotone>
+                  <a:schemeClr val="accent1">
+                    <a:shade val="45000"/>
+                    <a:satMod val="135000"/>
+                  </a:schemeClr>
+                  <a:prstClr val="white"/>
+                </a:duotone>
+                <a:extLst>
+                  <a:ext uri="{BEBA8EAE-BF5A-486C-A8C5-ECC9F3942E4B}">
+                    <a14:imgProps xmlns:a14="http://schemas.microsoft.com/office/drawing/2010/main">
+                      <a14:imgLayer r:embed="rId3">
+                        <a14:imgEffect>
+                          <a14:saturation sat="95000"/>
+                        </a14:imgEffect>
+                        <a14:imgEffect>
+                          <a14:brightnessContrast bright="-40000" contrast="20000"/>
+                        </a14:imgEffect>
+                      </a14:imgLayer>
+                    </a14:imgProps>
+                  </a:ext>
+                </a:extLst>
+              </a:blip>
+              <a:srcRect/>
+              <a:tile tx="50800" ty="0" sx="85000" sy="85000" flip="none" algn="tl"/>
+            </a:blipFill>
+            <a:ln w="25400" cap="flat" cmpd="sng" algn="ctr">
+              <a:noFill/>
+              <a:prstDash val="solid"/>
+            </a:ln>
+            <a:effectLst/>
+          </p:spPr>
+        </p:sp>
+        <p:sp>
+          <p:nvSpPr>
+            <p:cNvPr id="16" name="Oval 15">
+              <a:extLst>
+                <a:ext uri="{FF2B5EF4-FFF2-40B4-BE49-F238E27FC236}">
+                  <a16:creationId xmlns:a16="http://schemas.microsoft.com/office/drawing/2014/main" id="{D6C61C9C-364D-4CB6-B9D1-1A6F50F6AF03}"/>
+                </a:ext>
+                <a:ext uri="{C183D7F6-B498-43B3-948B-1728B52AA6E4}">
+                  <adec:decorative xmlns:adec="http://schemas.microsoft.com/office/drawing/2017/decorative" val="1"/>
+                </a:ext>
+              </a:extLst>
+            </p:cNvPr>
+            <p:cNvSpPr/>
+            <p:nvPr>
+              <p:extLst>
+                <p:ext uri="{386F3935-93C4-4BCD-93E2-E3B085C9AB24}">
+                  <p16:designElem xmlns:p16="http://schemas.microsoft.com/office/powerpoint/2015/main" val="1"/>
+                </p:ext>
+              </p:extLst>
+            </p:nvPr>
+          </p:nvSpPr>
+          <p:spPr>
+            <a:xfrm>
+              <a:off x="11396488" y="6230844"/>
+              <a:ext cx="478576" cy="478578"/>
+            </a:xfrm>
+            <a:prstGeom prst="ellipse">
+              <a:avLst/>
+            </a:prstGeom>
+            <a:noFill/>
+            <a:ln w="12700" cap="flat" cmpd="sng" algn="ctr">
+              <a:solidFill>
+                <a:srgbClr val="FFFFFF"/>
+              </a:solidFill>
+              <a:prstDash val="solid"/>
+            </a:ln>
+            <a:effectLst/>
+          </p:spPr>
+        </p:sp>
+      </p:grpSp>
+      <p:sp useBgFill="1">
+        <p:nvSpPr>
+          <p:cNvPr id="24" name="Rectangle 23">
+            <a:extLst>
+              <a:ext uri="{FF2B5EF4-FFF2-40B4-BE49-F238E27FC236}">
+                <a16:creationId xmlns:a16="http://schemas.microsoft.com/office/drawing/2014/main" id="{9C9664EF-0D74-4781-B4B4-646A93B50BC2}"/>
+              </a:ext>
+              <a:ext uri="{C183D7F6-B498-43B3-948B-1728B52AA6E4}">
+                <adec:decorative xmlns:adec="http://schemas.microsoft.com/office/drawing/2017/decorative" val="1"/>
+              </a:ext>
+            </a:extLst>
+          </p:cNvPr>
+          <p:cNvSpPr>
+            <a:spLocks noGrp="1" noRot="1" noChangeAspect="1" noMove="1" noResize="1" noEditPoints="1" noAdjustHandles="1" noChangeArrowheads="1" noChangeShapeType="1" noTextEdit="1"/>
+          </p:cNvSpPr>
+          <p:nvPr>
+            <p:extLst>
+              <p:ext uri="{386F3935-93C4-4BCD-93E2-E3B085C9AB24}">
+                <p16:designElem xmlns:p16="http://schemas.microsoft.com/office/powerpoint/2015/main" val="1"/>
+              </p:ext>
+            </p:extLst>
+          </p:nvPr>
+        </p:nvSpPr>
+        <p:spPr>
+          <a:xfrm>
+            <a:off x="0" y="0"/>
+            <a:ext cx="9144000" cy="6858000"/>
+          </a:xfrm>
+          <a:prstGeom prst="rect">
+            <a:avLst/>
+          </a:prstGeom>
+          <a:ln>
+            <a:noFill/>
+          </a:ln>
+        </p:spPr>
+        <p:style>
+          <a:lnRef idx="2">
+            <a:schemeClr val="accent1">
+              <a:shade val="50000"/>
+            </a:schemeClr>
+          </a:lnRef>
+          <a:fillRef idx="1">
+            <a:schemeClr val="accent1"/>
+          </a:fillRef>
+          <a:effectRef idx="0">
+            <a:schemeClr val="accent1"/>
+          </a:effectRef>
+          <a:fontRef idx="minor">
+            <a:schemeClr val="lt1"/>
+          </a:fontRef>
+        </p:style>
+        <p:txBody>
+          <a:bodyPr rtlCol="0" anchor="ctr"/>
+          <a:lstStyle/>
+          <a:p>
+            <a:pPr algn="ctr"/>
+            <a:endParaRPr lang="en-US"/>
+          </a:p>
+        </p:txBody>
+      </p:sp>
+      <p:sp>
+        <p:nvSpPr>
+          <p:cNvPr id="25" name="Rectangle 24">
+            <a:extLst>
+              <a:ext uri="{FF2B5EF4-FFF2-40B4-BE49-F238E27FC236}">
+                <a16:creationId xmlns:a16="http://schemas.microsoft.com/office/drawing/2014/main" id="{854C0CC2-F056-47AD-A361-F33F5EE97696}"/>
+              </a:ext>
+              <a:ext uri="{C183D7F6-B498-43B3-948B-1728B52AA6E4}">
+                <adec:decorative xmlns:adec="http://schemas.microsoft.com/office/drawing/2017/decorative" val="1"/>
+              </a:ext>
+            </a:extLst>
+          </p:cNvPr>
+          <p:cNvSpPr>
+            <a:spLocks noGrp="1" noRot="1" noChangeAspect="1" noMove="1" noResize="1" noEditPoints="1" noAdjustHandles="1" noChangeArrowheads="1" noChangeShapeType="1" noTextEdit="1"/>
+          </p:cNvSpPr>
+          <p:nvPr>
+            <p:extLst>
+              <p:ext uri="{386F3935-93C4-4BCD-93E2-E3B085C9AB24}">
+                <p16:designElem xmlns:p16="http://schemas.microsoft.com/office/powerpoint/2015/main" val="1"/>
+              </p:ext>
+            </p:extLst>
+          </p:nvPr>
+        </p:nvSpPr>
+        <p:spPr>
+          <a:xfrm>
+            <a:off x="0" y="0"/>
+            <a:ext cx="9143999" cy="6857999"/>
+          </a:xfrm>
+          <a:prstGeom prst="rect">
+            <a:avLst/>
+          </a:prstGeom>
+          <a:blipFill dpi="0" rotWithShape="1">
+            <a:blip r:embed="rId4">
+              <a:alphaModFix amt="60000"/>
+              <a:lum bright="70000" contrast="-70000"/>
+              <a:extLst>
+                <a:ext uri="{BEBA8EAE-BF5A-486C-A8C5-ECC9F3942E4B}">
+                  <a14:imgProps xmlns:a14="http://schemas.microsoft.com/office/drawing/2010/main">
+                    <a14:imgLayer r:embed="rId5">
+                      <a14:imgEffect>
+                        <a14:sharpenSoften amount="61000"/>
+                      </a14:imgEffect>
+                    </a14:imgLayer>
+                  </a14:imgProps>
+                </a:ext>
+                <a:ext uri="{28A0092B-C50C-407E-A947-70E740481C1C}">
+                  <a14:useLocalDpi xmlns:a14="http://schemas.microsoft.com/office/drawing/2010/main" val="0"/>
+                </a:ext>
+              </a:extLst>
+            </a:blip>
+            <a:srcRect/>
+            <a:tile tx="0" ty="-704850" sx="92000" sy="89000" flip="xy" algn="ctr"/>
+          </a:blipFill>
+          <a:ln>
+            <a:noFill/>
+          </a:ln>
+        </p:spPr>
+        <p:style>
+          <a:lnRef idx="2">
+            <a:schemeClr val="accent1">
+              <a:shade val="50000"/>
+            </a:schemeClr>
+          </a:lnRef>
+          <a:fillRef idx="1">
+            <a:schemeClr val="accent1"/>
+          </a:fillRef>
+          <a:effectRef idx="0">
+            <a:schemeClr val="accent1"/>
+          </a:effectRef>
+          <a:fontRef idx="minor">
+            <a:schemeClr val="lt1"/>
+          </a:fontRef>
+        </p:style>
+      </p:sp>
+      <p:sp useBgFill="1">
+        <p:nvSpPr>
+          <p:cNvPr id="22" name="Rectangle 21">
+            <a:extLst>
+              <a:ext uri="{FF2B5EF4-FFF2-40B4-BE49-F238E27FC236}">
+                <a16:creationId xmlns:a16="http://schemas.microsoft.com/office/drawing/2014/main" id="{CD560C9F-7A8F-4FBA-BD3A-EB75B62E45D5}"/>
+              </a:ext>
+              <a:ext uri="{C183D7F6-B498-43B3-948B-1728B52AA6E4}">
+                <adec:decorative xmlns:adec="http://schemas.microsoft.com/office/drawing/2017/decorative" val="1"/>
+              </a:ext>
+            </a:extLst>
+          </p:cNvPr>
+          <p:cNvSpPr>
+            <a:spLocks noGrp="1" noRot="1" noChangeAspect="1" noMove="1" noResize="1" noEditPoints="1" noAdjustHandles="1" noChangeArrowheads="1" noChangeShapeType="1" noTextEdit="1"/>
+          </p:cNvSpPr>
+          <p:nvPr>
+            <p:extLst>
+              <p:ext uri="{386F3935-93C4-4BCD-93E2-E3B085C9AB24}">
+                <p16:designElem xmlns:p16="http://schemas.microsoft.com/office/powerpoint/2015/main" val="1"/>
+              </p:ext>
+            </p:extLst>
+          </p:nvPr>
+        </p:nvSpPr>
+        <p:spPr>
+          <a:xfrm>
+            <a:off x="357759" y="480060"/>
+            <a:ext cx="8428482" cy="5897880"/>
+          </a:xfrm>
+          <a:prstGeom prst="rect">
+            <a:avLst/>
+          </a:prstGeom>
+          <a:ln w="22225">
+            <a:solidFill>
+              <a:srgbClr val="F1CB90"/>
+            </a:solidFill>
+          </a:ln>
+        </p:spPr>
+        <p:style>
+          <a:lnRef idx="2">
+            <a:schemeClr val="accent1">
+              <a:shade val="50000"/>
+            </a:schemeClr>
+          </a:lnRef>
+          <a:fillRef idx="1">
+            <a:schemeClr val="accent1"/>
+          </a:fillRef>
+          <a:effectRef idx="0">
+            <a:schemeClr val="accent1"/>
+          </a:effectRef>
+          <a:fontRef idx="minor">
+            <a:schemeClr val="lt1"/>
+          </a:fontRef>
+        </p:style>
+        <p:txBody>
+          <a:bodyPr rtlCol="0" anchor="ctr"/>
+          <a:lstStyle/>
+          <a:p>
+            <a:pPr algn="ctr"/>
+            <a:endParaRPr lang="en-US"/>
+          </a:p>
+        </p:txBody>
+      </p:sp>
+      <p:pic>
+        <p:nvPicPr>
+          <p:cNvPr id="9" name="Picture 8" descr="A person playing ping pong&#10;&#10;Description automatically generated">
+            <a:extLst>
+              <a:ext uri="{FF2B5EF4-FFF2-40B4-BE49-F238E27FC236}">
+                <a16:creationId xmlns:a16="http://schemas.microsoft.com/office/drawing/2014/main" id="{1ECB17D4-C508-946A-F255-A30B2C906345}"/>
+              </a:ext>
+            </a:extLst>
+          </p:cNvPr>
+          <p:cNvPicPr>
+            <a:picLocks noChangeAspect="1"/>
+          </p:cNvPicPr>
+          <p:nvPr/>
+        </p:nvPicPr>
+        <p:blipFill>
+          <a:blip r:embed="rId6"/>
+          <a:stretch>
+            <a:fillRect/>
+          </a:stretch>
+        </p:blipFill>
+        <p:spPr>
+          <a:xfrm>
+            <a:off x="2214265" y="801792"/>
+            <a:ext cx="4711275" cy="5249332"/>
+          </a:xfrm>
+          <a:prstGeom prst="rect">
+            <a:avLst/>
+          </a:prstGeom>
+        </p:spPr>
+      </p:pic>
       <p:sp>
         <p:nvSpPr>
           <p:cNvPr id="4" name="Slide Number Placeholder 3">
@@ -5587,6 +5956,104 @@
             <p:ph type="sldNum" sz="quarter" idx="12"/>
           </p:nvPr>
         </p:nvSpPr>
+        <p:spPr>
+          <a:xfrm>
+            <a:off x="8483346" y="6368646"/>
+            <a:ext cx="480060" cy="365125"/>
+          </a:xfrm>
+        </p:spPr>
+        <p:txBody>
+          <a:bodyPr vert="horz" lIns="91440" tIns="45720" rIns="91440" bIns="45720" rtlCol="0" anchor="ctr">
+            <a:normAutofit/>
+          </a:bodyPr>
+          <a:lstStyle/>
+          <a:p>
+            <a:pPr>
+              <a:spcAft>
+                <a:spcPts val="600"/>
+              </a:spcAft>
+            </a:pPr>
+            <a:fld id="{4FAB73BC-B049-4115-A692-8D63A059BFB8}" type="slidenum">
+              <a:rPr lang="en-US" sz="1400">
+                <a:solidFill>
+                  <a:schemeClr val="tx2"/>
+                </a:solidFill>
+                <a:latin typeface="+mj-lt"/>
+              </a:rPr>
+              <a:pPr>
+                <a:spcAft>
+                  <a:spcPts val="600"/>
+                </a:spcAft>
+              </a:pPr>
+              <a:t>13</a:t>
+            </a:fld>
+            <a:endParaRPr lang="en-US" sz="1400">
+              <a:solidFill>
+                <a:schemeClr val="tx2"/>
+              </a:solidFill>
+              <a:latin typeface="+mj-lt"/>
+            </a:endParaRPr>
+          </a:p>
+        </p:txBody>
+      </p:sp>
+    </p:spTree>
+    <p:extLst>
+      <p:ext uri="{BB962C8B-B14F-4D97-AF65-F5344CB8AC3E}">
+        <p14:creationId xmlns:p14="http://schemas.microsoft.com/office/powerpoint/2010/main" val="1589159526"/>
+      </p:ext>
+    </p:extLst>
+  </p:cSld>
+  <p:clrMapOvr>
+    <a:masterClrMapping/>
+  </p:clrMapOvr>
+  <mc:AlternateContent xmlns:mc="http://schemas.openxmlformats.org/markup-compatibility/2006">
+    <mc:Choice xmlns:p159="http://schemas.microsoft.com/office/powerpoint/2015/09/main" Requires="p159">
+      <p:transition xmlns:p14="http://schemas.microsoft.com/office/powerpoint/2010/main" spd="slow" p14:dur="2000">
+        <p159:morph option="byWord"/>
+      </p:transition>
+    </mc:Choice>
+    <mc:Fallback>
+      <p:transition spd="slow">
+        <p:fade/>
+      </p:transition>
+    </mc:Fallback>
+  </mc:AlternateContent>
+</p:sld>
+</file>
+
+<file path=ppt/slides/slide14.xml><?xml version="1.0" encoding="utf-8"?>
+<p:sld xmlns:a="http://schemas.openxmlformats.org/drawingml/2006/main" xmlns:r="http://schemas.openxmlformats.org/officeDocument/2006/relationships" xmlns:p="http://schemas.openxmlformats.org/presentationml/2006/main">
+  <p:cSld>
+    <p:spTree>
+      <p:nvGrpSpPr>
+        <p:cNvPr id="1" name=""/>
+        <p:cNvGrpSpPr/>
+        <p:nvPr/>
+      </p:nvGrpSpPr>
+      <p:grpSpPr>
+        <a:xfrm>
+          <a:off x="0" y="0"/>
+          <a:ext cx="0" cy="0"/>
+          <a:chOff x="0" y="0"/>
+          <a:chExt cx="0" cy="0"/>
+        </a:xfrm>
+      </p:grpSpPr>
+      <p:sp>
+        <p:nvSpPr>
+          <p:cNvPr id="4" name="Slide Number Placeholder 3">
+            <a:extLst>
+              <a:ext uri="{FF2B5EF4-FFF2-40B4-BE49-F238E27FC236}">
+                <a16:creationId xmlns:a16="http://schemas.microsoft.com/office/drawing/2014/main" id="{BE22E49D-0F32-DA93-2708-A8B33217FD90}"/>
+              </a:ext>
+            </a:extLst>
+          </p:cNvPr>
+          <p:cNvSpPr>
+            <a:spLocks noGrp="1"/>
+          </p:cNvSpPr>
+          <p:nvPr>
+            <p:ph type="sldNum" sz="quarter" idx="12"/>
+          </p:nvPr>
+        </p:nvSpPr>
         <p:spPr/>
         <p:txBody>
           <a:bodyPr/>
@@ -5595,7 +6062,7 @@
             <a:fld id="{4FAB73BC-B049-4115-A692-8D63A059BFB8}" type="slidenum">
               <a:rPr lang="en-US" smtClean="0"/>
               <a:pPr/>
-              <a:t>13</a:t>
+              <a:t>14</a:t>
             </a:fld>
             <a:endParaRPr lang="en-US"/>
           </a:p>
@@ -5709,7 +6176,7 @@
     </p:spTree>
     <p:extLst>
       <p:ext uri="{BB962C8B-B14F-4D97-AF65-F5344CB8AC3E}">
-        <p14:creationId xmlns:p14="http://schemas.microsoft.com/office/powerpoint/2010/main" val="1589159526"/>
+        <p14:creationId xmlns:p14="http://schemas.microsoft.com/office/powerpoint/2010/main" val="2449915887"/>
       </p:ext>
     </p:extLst>
   </p:cSld>
@@ -5731,7 +6198,7 @@
 </p:sld>
 </file>
 
-<file path=ppt/slides/slide14.xml><?xml version="1.0" encoding="utf-8"?>
+<file path=ppt/slides/slide15.xml><?xml version="1.0" encoding="utf-8"?>
 <p:sld xmlns:a="http://schemas.openxmlformats.org/drawingml/2006/main" xmlns:r="http://schemas.openxmlformats.org/officeDocument/2006/relationships" xmlns:p="http://schemas.openxmlformats.org/presentationml/2006/main">
   <p:cSld>
     <p:spTree>
@@ -5843,7 +6310,7 @@
             <a:fld id="{4FAB73BC-B049-4115-A692-8D63A059BFB8}" type="slidenum">
               <a:rPr lang="en-US" smtClean="0"/>
               <a:pPr/>
-              <a:t>14</a:t>
+              <a:t>15</a:t>
             </a:fld>
             <a:endParaRPr lang="en-US"/>
           </a:p>

</xml_diff>